<commit_message>
feat: k8s file update
</commit_message>
<xml_diff>
--- a/_posts/k8s/Kubernetes原理.pptx
+++ b/_posts/k8s/Kubernetes原理.pptx
@@ -5,7 +5,7 @@
     <p:sldMasterId id="2147483660" r:id="rId1"/>
   </p:sldMasterIdLst>
   <p:notesMasterIdLst>
-    <p:notesMasterId r:id="rId34"/>
+    <p:notesMasterId r:id="rId36"/>
   </p:notesMasterIdLst>
   <p:sldIdLst>
     <p:sldId id="256" r:id="rId2"/>
@@ -27,19 +27,21 @@
     <p:sldId id="263" r:id="rId18"/>
     <p:sldId id="299" r:id="rId19"/>
     <p:sldId id="298" r:id="rId20"/>
-    <p:sldId id="265" r:id="rId21"/>
-    <p:sldId id="266" r:id="rId22"/>
-    <p:sldId id="267" r:id="rId23"/>
-    <p:sldId id="268" r:id="rId24"/>
-    <p:sldId id="270" r:id="rId25"/>
-    <p:sldId id="272" r:id="rId26"/>
-    <p:sldId id="273" r:id="rId27"/>
-    <p:sldId id="274" r:id="rId28"/>
-    <p:sldId id="275" r:id="rId29"/>
-    <p:sldId id="277" r:id="rId30"/>
-    <p:sldId id="278" r:id="rId31"/>
-    <p:sldId id="279" r:id="rId32"/>
-    <p:sldId id="280" r:id="rId33"/>
+    <p:sldId id="300" r:id="rId21"/>
+    <p:sldId id="301" r:id="rId22"/>
+    <p:sldId id="265" r:id="rId23"/>
+    <p:sldId id="266" r:id="rId24"/>
+    <p:sldId id="267" r:id="rId25"/>
+    <p:sldId id="268" r:id="rId26"/>
+    <p:sldId id="270" r:id="rId27"/>
+    <p:sldId id="272" r:id="rId28"/>
+    <p:sldId id="273" r:id="rId29"/>
+    <p:sldId id="274" r:id="rId30"/>
+    <p:sldId id="275" r:id="rId31"/>
+    <p:sldId id="277" r:id="rId32"/>
+    <p:sldId id="278" r:id="rId33"/>
+    <p:sldId id="279" r:id="rId34"/>
+    <p:sldId id="280" r:id="rId35"/>
   </p:sldIdLst>
   <p:sldSz cx="12192000" cy="6858000"/>
   <p:notesSz cx="6858000" cy="9144000"/>
@@ -162,6 +164,8 @@
             <p14:sldId id="263"/>
             <p14:sldId id="299"/>
             <p14:sldId id="298"/>
+            <p14:sldId id="300"/>
+            <p14:sldId id="301"/>
             <p14:sldId id="265"/>
             <p14:sldId id="266"/>
             <p14:sldId id="267"/>
@@ -3962,6 +3966,753 @@
 </file>
 
 <file path=ppt/diagrams/colors14.xml><?xml version="1.0" encoding="utf-8"?>
+<dgm:colorsDef xmlns:dgm="http://schemas.openxmlformats.org/drawingml/2006/diagram" xmlns:a="http://schemas.openxmlformats.org/drawingml/2006/main" uniqueId="urn:microsoft.com/office/officeart/2005/8/colors/accent1_2">
+  <dgm:title val=""/>
+  <dgm:desc val=""/>
+  <dgm:catLst>
+    <dgm:cat type="accent1" pri="11200"/>
+  </dgm:catLst>
+  <dgm:styleLbl name="node0">
+    <dgm:fillClrLst meth="repeat">
+      <a:schemeClr val="accent1"/>
+    </dgm:fillClrLst>
+    <dgm:linClrLst meth="repeat">
+      <a:schemeClr val="lt1"/>
+    </dgm:linClrLst>
+    <dgm:effectClrLst/>
+    <dgm:txLinClrLst/>
+    <dgm:txFillClrLst/>
+    <dgm:txEffectClrLst/>
+  </dgm:styleLbl>
+  <dgm:styleLbl name="alignNode1">
+    <dgm:fillClrLst meth="repeat">
+      <a:schemeClr val="accent1"/>
+    </dgm:fillClrLst>
+    <dgm:linClrLst meth="repeat">
+      <a:schemeClr val="accent1"/>
+    </dgm:linClrLst>
+    <dgm:effectClrLst/>
+    <dgm:txLinClrLst/>
+    <dgm:txFillClrLst/>
+    <dgm:txEffectClrLst/>
+  </dgm:styleLbl>
+  <dgm:styleLbl name="node1">
+    <dgm:fillClrLst meth="repeat">
+      <a:schemeClr val="accent1"/>
+    </dgm:fillClrLst>
+    <dgm:linClrLst meth="repeat">
+      <a:schemeClr val="lt1"/>
+    </dgm:linClrLst>
+    <dgm:effectClrLst/>
+    <dgm:txLinClrLst/>
+    <dgm:txFillClrLst/>
+    <dgm:txEffectClrLst/>
+  </dgm:styleLbl>
+  <dgm:styleLbl name="lnNode1">
+    <dgm:fillClrLst meth="repeat">
+      <a:schemeClr val="accent1"/>
+    </dgm:fillClrLst>
+    <dgm:linClrLst meth="repeat">
+      <a:schemeClr val="lt1"/>
+    </dgm:linClrLst>
+    <dgm:effectClrLst/>
+    <dgm:txLinClrLst/>
+    <dgm:txFillClrLst/>
+    <dgm:txEffectClrLst/>
+  </dgm:styleLbl>
+  <dgm:styleLbl name="vennNode1">
+    <dgm:fillClrLst meth="repeat">
+      <a:schemeClr val="accent1">
+        <a:alpha val="50000"/>
+      </a:schemeClr>
+    </dgm:fillClrLst>
+    <dgm:linClrLst meth="repeat">
+      <a:schemeClr val="lt1"/>
+    </dgm:linClrLst>
+    <dgm:effectClrLst/>
+    <dgm:txLinClrLst/>
+    <dgm:txFillClrLst/>
+    <dgm:txEffectClrLst/>
+  </dgm:styleLbl>
+  <dgm:styleLbl name="node2">
+    <dgm:fillClrLst meth="repeat">
+      <a:schemeClr val="accent1"/>
+    </dgm:fillClrLst>
+    <dgm:linClrLst meth="repeat">
+      <a:schemeClr val="lt1"/>
+    </dgm:linClrLst>
+    <dgm:effectClrLst/>
+    <dgm:txLinClrLst/>
+    <dgm:txFillClrLst/>
+    <dgm:txEffectClrLst/>
+  </dgm:styleLbl>
+  <dgm:styleLbl name="node3">
+    <dgm:fillClrLst meth="repeat">
+      <a:schemeClr val="accent1"/>
+    </dgm:fillClrLst>
+    <dgm:linClrLst meth="repeat">
+      <a:schemeClr val="lt1"/>
+    </dgm:linClrLst>
+    <dgm:effectClrLst/>
+    <dgm:txLinClrLst/>
+    <dgm:txFillClrLst/>
+    <dgm:txEffectClrLst/>
+  </dgm:styleLbl>
+  <dgm:styleLbl name="node4">
+    <dgm:fillClrLst meth="repeat">
+      <a:schemeClr val="accent1"/>
+    </dgm:fillClrLst>
+    <dgm:linClrLst meth="repeat">
+      <a:schemeClr val="lt1"/>
+    </dgm:linClrLst>
+    <dgm:effectClrLst/>
+    <dgm:txLinClrLst/>
+    <dgm:txFillClrLst/>
+    <dgm:txEffectClrLst/>
+  </dgm:styleLbl>
+  <dgm:styleLbl name="fgImgPlace1">
+    <dgm:fillClrLst meth="repeat">
+      <a:schemeClr val="accent1">
+        <a:tint val="50000"/>
+      </a:schemeClr>
+    </dgm:fillClrLst>
+    <dgm:linClrLst meth="repeat">
+      <a:schemeClr val="lt1"/>
+    </dgm:linClrLst>
+    <dgm:effectClrLst/>
+    <dgm:txLinClrLst/>
+    <dgm:txFillClrLst meth="repeat">
+      <a:schemeClr val="lt1"/>
+    </dgm:txFillClrLst>
+    <dgm:txEffectClrLst/>
+  </dgm:styleLbl>
+  <dgm:styleLbl name="alignImgPlace1">
+    <dgm:fillClrLst meth="repeat">
+      <a:schemeClr val="accent1">
+        <a:tint val="50000"/>
+      </a:schemeClr>
+    </dgm:fillClrLst>
+    <dgm:linClrLst meth="repeat">
+      <a:schemeClr val="lt1"/>
+    </dgm:linClrLst>
+    <dgm:effectClrLst/>
+    <dgm:txLinClrLst/>
+    <dgm:txFillClrLst meth="repeat">
+      <a:schemeClr val="lt1"/>
+    </dgm:txFillClrLst>
+    <dgm:txEffectClrLst/>
+  </dgm:styleLbl>
+  <dgm:styleLbl name="bgImgPlace1">
+    <dgm:fillClrLst meth="repeat">
+      <a:schemeClr val="accent1">
+        <a:tint val="50000"/>
+      </a:schemeClr>
+    </dgm:fillClrLst>
+    <dgm:linClrLst meth="repeat">
+      <a:schemeClr val="lt1"/>
+    </dgm:linClrLst>
+    <dgm:effectClrLst/>
+    <dgm:txLinClrLst/>
+    <dgm:txFillClrLst meth="repeat">
+      <a:schemeClr val="lt1"/>
+    </dgm:txFillClrLst>
+    <dgm:txEffectClrLst/>
+  </dgm:styleLbl>
+  <dgm:styleLbl name="sibTrans2D1">
+    <dgm:fillClrLst meth="repeat">
+      <a:schemeClr val="accent1">
+        <a:tint val="60000"/>
+      </a:schemeClr>
+    </dgm:fillClrLst>
+    <dgm:linClrLst meth="repeat">
+      <a:schemeClr val="accent1">
+        <a:tint val="60000"/>
+      </a:schemeClr>
+    </dgm:linClrLst>
+    <dgm:effectClrLst/>
+    <dgm:txLinClrLst/>
+    <dgm:txFillClrLst/>
+    <dgm:txEffectClrLst/>
+  </dgm:styleLbl>
+  <dgm:styleLbl name="fgSibTrans2D1">
+    <dgm:fillClrLst meth="repeat">
+      <a:schemeClr val="accent1">
+        <a:tint val="60000"/>
+      </a:schemeClr>
+    </dgm:fillClrLst>
+    <dgm:linClrLst meth="repeat">
+      <a:schemeClr val="accent1">
+        <a:tint val="60000"/>
+      </a:schemeClr>
+    </dgm:linClrLst>
+    <dgm:effectClrLst/>
+    <dgm:txLinClrLst/>
+    <dgm:txFillClrLst/>
+    <dgm:txEffectClrLst/>
+  </dgm:styleLbl>
+  <dgm:styleLbl name="bgSibTrans2D1">
+    <dgm:fillClrLst meth="repeat">
+      <a:schemeClr val="accent1">
+        <a:tint val="60000"/>
+      </a:schemeClr>
+    </dgm:fillClrLst>
+    <dgm:linClrLst meth="repeat">
+      <a:schemeClr val="accent1">
+        <a:tint val="60000"/>
+      </a:schemeClr>
+    </dgm:linClrLst>
+    <dgm:effectClrLst/>
+    <dgm:txLinClrLst/>
+    <dgm:txFillClrLst/>
+    <dgm:txEffectClrLst/>
+  </dgm:styleLbl>
+  <dgm:styleLbl name="sibTrans1D1">
+    <dgm:fillClrLst meth="repeat">
+      <a:schemeClr val="accent1"/>
+    </dgm:fillClrLst>
+    <dgm:linClrLst meth="repeat">
+      <a:schemeClr val="accent1"/>
+    </dgm:linClrLst>
+    <dgm:effectClrLst/>
+    <dgm:txLinClrLst/>
+    <dgm:txFillClrLst meth="repeat">
+      <a:schemeClr val="tx1"/>
+    </dgm:txFillClrLst>
+    <dgm:txEffectClrLst/>
+  </dgm:styleLbl>
+  <dgm:styleLbl name="callout">
+    <dgm:fillClrLst meth="repeat">
+      <a:schemeClr val="accent1"/>
+    </dgm:fillClrLst>
+    <dgm:linClrLst meth="repeat">
+      <a:schemeClr val="accent1">
+        <a:tint val="50000"/>
+      </a:schemeClr>
+    </dgm:linClrLst>
+    <dgm:effectClrLst/>
+    <dgm:txLinClrLst/>
+    <dgm:txFillClrLst meth="repeat">
+      <a:schemeClr val="tx1"/>
+    </dgm:txFillClrLst>
+    <dgm:txEffectClrLst/>
+  </dgm:styleLbl>
+  <dgm:styleLbl name="asst0">
+    <dgm:fillClrLst meth="repeat">
+      <a:schemeClr val="accent1"/>
+    </dgm:fillClrLst>
+    <dgm:linClrLst meth="repeat">
+      <a:schemeClr val="lt1"/>
+    </dgm:linClrLst>
+    <dgm:effectClrLst/>
+    <dgm:txLinClrLst/>
+    <dgm:txFillClrLst/>
+    <dgm:txEffectClrLst/>
+  </dgm:styleLbl>
+  <dgm:styleLbl name="asst1">
+    <dgm:fillClrLst meth="repeat">
+      <a:schemeClr val="accent1"/>
+    </dgm:fillClrLst>
+    <dgm:linClrLst meth="repeat">
+      <a:schemeClr val="lt1"/>
+    </dgm:linClrLst>
+    <dgm:effectClrLst/>
+    <dgm:txLinClrLst/>
+    <dgm:txFillClrLst/>
+    <dgm:txEffectClrLst/>
+  </dgm:styleLbl>
+  <dgm:styleLbl name="asst2">
+    <dgm:fillClrLst meth="repeat">
+      <a:schemeClr val="accent1"/>
+    </dgm:fillClrLst>
+    <dgm:linClrLst meth="repeat">
+      <a:schemeClr val="lt1"/>
+    </dgm:linClrLst>
+    <dgm:effectClrLst/>
+    <dgm:txLinClrLst/>
+    <dgm:txFillClrLst/>
+    <dgm:txEffectClrLst/>
+  </dgm:styleLbl>
+  <dgm:styleLbl name="asst3">
+    <dgm:fillClrLst meth="repeat">
+      <a:schemeClr val="accent1"/>
+    </dgm:fillClrLst>
+    <dgm:linClrLst meth="repeat">
+      <a:schemeClr val="lt1"/>
+    </dgm:linClrLst>
+    <dgm:effectClrLst/>
+    <dgm:txLinClrLst/>
+    <dgm:txFillClrLst/>
+    <dgm:txEffectClrLst/>
+  </dgm:styleLbl>
+  <dgm:styleLbl name="asst4">
+    <dgm:fillClrLst meth="repeat">
+      <a:schemeClr val="accent1"/>
+    </dgm:fillClrLst>
+    <dgm:linClrLst meth="repeat">
+      <a:schemeClr val="lt1"/>
+    </dgm:linClrLst>
+    <dgm:effectClrLst/>
+    <dgm:txLinClrLst/>
+    <dgm:txFillClrLst/>
+    <dgm:txEffectClrLst/>
+  </dgm:styleLbl>
+  <dgm:styleLbl name="parChTrans2D1">
+    <dgm:fillClrLst meth="repeat">
+      <a:schemeClr val="accent1">
+        <a:tint val="60000"/>
+      </a:schemeClr>
+    </dgm:fillClrLst>
+    <dgm:linClrLst meth="repeat">
+      <a:schemeClr val="accent1">
+        <a:tint val="60000"/>
+      </a:schemeClr>
+    </dgm:linClrLst>
+    <dgm:effectClrLst/>
+    <dgm:txLinClrLst/>
+    <dgm:txFillClrLst meth="repeat">
+      <a:schemeClr val="lt1"/>
+    </dgm:txFillClrLst>
+    <dgm:txEffectClrLst/>
+  </dgm:styleLbl>
+  <dgm:styleLbl name="parChTrans2D2">
+    <dgm:fillClrLst meth="repeat">
+      <a:schemeClr val="accent1"/>
+    </dgm:fillClrLst>
+    <dgm:linClrLst meth="repeat">
+      <a:schemeClr val="accent1"/>
+    </dgm:linClrLst>
+    <dgm:effectClrLst/>
+    <dgm:txLinClrLst/>
+    <dgm:txFillClrLst meth="repeat">
+      <a:schemeClr val="lt1"/>
+    </dgm:txFillClrLst>
+    <dgm:txEffectClrLst/>
+  </dgm:styleLbl>
+  <dgm:styleLbl name="parChTrans2D3">
+    <dgm:fillClrLst meth="repeat">
+      <a:schemeClr val="accent1"/>
+    </dgm:fillClrLst>
+    <dgm:linClrLst meth="repeat">
+      <a:schemeClr val="accent1"/>
+    </dgm:linClrLst>
+    <dgm:effectClrLst/>
+    <dgm:txLinClrLst/>
+    <dgm:txFillClrLst meth="repeat">
+      <a:schemeClr val="lt1"/>
+    </dgm:txFillClrLst>
+    <dgm:txEffectClrLst/>
+  </dgm:styleLbl>
+  <dgm:styleLbl name="parChTrans2D4">
+    <dgm:fillClrLst meth="repeat">
+      <a:schemeClr val="accent1"/>
+    </dgm:fillClrLst>
+    <dgm:linClrLst meth="repeat">
+      <a:schemeClr val="accent1"/>
+    </dgm:linClrLst>
+    <dgm:effectClrLst/>
+    <dgm:txLinClrLst/>
+    <dgm:txFillClrLst meth="repeat">
+      <a:schemeClr val="lt1"/>
+    </dgm:txFillClrLst>
+    <dgm:txEffectClrLst/>
+  </dgm:styleLbl>
+  <dgm:styleLbl name="parChTrans1D1">
+    <dgm:fillClrLst meth="repeat">
+      <a:schemeClr val="accent1"/>
+    </dgm:fillClrLst>
+    <dgm:linClrLst meth="repeat">
+      <a:schemeClr val="accent1">
+        <a:shade val="60000"/>
+      </a:schemeClr>
+    </dgm:linClrLst>
+    <dgm:effectClrLst/>
+    <dgm:txLinClrLst/>
+    <dgm:txFillClrLst meth="repeat">
+      <a:schemeClr val="tx1"/>
+    </dgm:txFillClrLst>
+    <dgm:txEffectClrLst/>
+  </dgm:styleLbl>
+  <dgm:styleLbl name="parChTrans1D2">
+    <dgm:fillClrLst meth="repeat">
+      <a:schemeClr val="accent1"/>
+    </dgm:fillClrLst>
+    <dgm:linClrLst meth="repeat">
+      <a:schemeClr val="accent1">
+        <a:shade val="60000"/>
+      </a:schemeClr>
+    </dgm:linClrLst>
+    <dgm:effectClrLst/>
+    <dgm:txLinClrLst/>
+    <dgm:txFillClrLst meth="repeat">
+      <a:schemeClr val="tx1"/>
+    </dgm:txFillClrLst>
+    <dgm:txEffectClrLst/>
+  </dgm:styleLbl>
+  <dgm:styleLbl name="parChTrans1D3">
+    <dgm:fillClrLst meth="repeat">
+      <a:schemeClr val="accent1"/>
+    </dgm:fillClrLst>
+    <dgm:linClrLst meth="repeat">
+      <a:schemeClr val="accent1">
+        <a:shade val="80000"/>
+      </a:schemeClr>
+    </dgm:linClrLst>
+    <dgm:effectClrLst/>
+    <dgm:txLinClrLst/>
+    <dgm:txFillClrLst meth="repeat">
+      <a:schemeClr val="tx1"/>
+    </dgm:txFillClrLst>
+    <dgm:txEffectClrLst/>
+  </dgm:styleLbl>
+  <dgm:styleLbl name="parChTrans1D4">
+    <dgm:fillClrLst meth="repeat">
+      <a:schemeClr val="accent1"/>
+    </dgm:fillClrLst>
+    <dgm:linClrLst meth="repeat">
+      <a:schemeClr val="accent1">
+        <a:shade val="80000"/>
+      </a:schemeClr>
+    </dgm:linClrLst>
+    <dgm:effectClrLst/>
+    <dgm:txLinClrLst/>
+    <dgm:txFillClrLst meth="repeat">
+      <a:schemeClr val="tx1"/>
+    </dgm:txFillClrLst>
+    <dgm:txEffectClrLst/>
+  </dgm:styleLbl>
+  <dgm:styleLbl name="fgAcc1">
+    <dgm:fillClrLst meth="repeat">
+      <a:schemeClr val="lt1">
+        <a:alpha val="90000"/>
+      </a:schemeClr>
+    </dgm:fillClrLst>
+    <dgm:linClrLst meth="repeat">
+      <a:schemeClr val="accent1"/>
+    </dgm:linClrLst>
+    <dgm:effectClrLst/>
+    <dgm:txLinClrLst/>
+    <dgm:txFillClrLst meth="repeat">
+      <a:schemeClr val="dk1"/>
+    </dgm:txFillClrLst>
+    <dgm:txEffectClrLst/>
+  </dgm:styleLbl>
+  <dgm:styleLbl name="conFgAcc1">
+    <dgm:fillClrLst meth="repeat">
+      <a:schemeClr val="lt1">
+        <a:alpha val="90000"/>
+      </a:schemeClr>
+    </dgm:fillClrLst>
+    <dgm:linClrLst meth="repeat">
+      <a:schemeClr val="accent1"/>
+    </dgm:linClrLst>
+    <dgm:effectClrLst/>
+    <dgm:txLinClrLst/>
+    <dgm:txFillClrLst meth="repeat">
+      <a:schemeClr val="dk1"/>
+    </dgm:txFillClrLst>
+    <dgm:txEffectClrLst/>
+  </dgm:styleLbl>
+  <dgm:styleLbl name="alignAcc1">
+    <dgm:fillClrLst meth="repeat">
+      <a:schemeClr val="lt1">
+        <a:alpha val="90000"/>
+      </a:schemeClr>
+    </dgm:fillClrLst>
+    <dgm:linClrLst meth="repeat">
+      <a:schemeClr val="accent1"/>
+    </dgm:linClrLst>
+    <dgm:effectClrLst/>
+    <dgm:txLinClrLst/>
+    <dgm:txFillClrLst meth="repeat">
+      <a:schemeClr val="dk1"/>
+    </dgm:txFillClrLst>
+    <dgm:txEffectClrLst/>
+  </dgm:styleLbl>
+  <dgm:styleLbl name="trAlignAcc1">
+    <dgm:fillClrLst meth="repeat">
+      <a:schemeClr val="lt1">
+        <a:alpha val="40000"/>
+      </a:schemeClr>
+    </dgm:fillClrLst>
+    <dgm:linClrLst meth="repeat">
+      <a:schemeClr val="accent1"/>
+    </dgm:linClrLst>
+    <dgm:effectClrLst/>
+    <dgm:txLinClrLst/>
+    <dgm:txFillClrLst meth="repeat">
+      <a:schemeClr val="dk1"/>
+    </dgm:txFillClrLst>
+    <dgm:txEffectClrLst/>
+  </dgm:styleLbl>
+  <dgm:styleLbl name="bgAcc1">
+    <dgm:fillClrLst meth="repeat">
+      <a:schemeClr val="lt1">
+        <a:alpha val="90000"/>
+      </a:schemeClr>
+    </dgm:fillClrLst>
+    <dgm:linClrLst meth="repeat">
+      <a:schemeClr val="accent1"/>
+    </dgm:linClrLst>
+    <dgm:effectClrLst/>
+    <dgm:txLinClrLst/>
+    <dgm:txFillClrLst meth="repeat">
+      <a:schemeClr val="dk1"/>
+    </dgm:txFillClrLst>
+    <dgm:txEffectClrLst/>
+  </dgm:styleLbl>
+  <dgm:styleLbl name="solidFgAcc1">
+    <dgm:fillClrLst meth="repeat">
+      <a:schemeClr val="lt1"/>
+    </dgm:fillClrLst>
+    <dgm:linClrLst meth="repeat">
+      <a:schemeClr val="accent1"/>
+    </dgm:linClrLst>
+    <dgm:effectClrLst/>
+    <dgm:txLinClrLst/>
+    <dgm:txFillClrLst meth="repeat">
+      <a:schemeClr val="dk1"/>
+    </dgm:txFillClrLst>
+    <dgm:txEffectClrLst/>
+  </dgm:styleLbl>
+  <dgm:styleLbl name="solidAlignAcc1">
+    <dgm:fillClrLst meth="repeat">
+      <a:schemeClr val="lt1"/>
+    </dgm:fillClrLst>
+    <dgm:linClrLst meth="repeat">
+      <a:schemeClr val="accent1"/>
+    </dgm:linClrLst>
+    <dgm:effectClrLst/>
+    <dgm:txLinClrLst/>
+    <dgm:txFillClrLst meth="repeat">
+      <a:schemeClr val="dk1"/>
+    </dgm:txFillClrLst>
+    <dgm:txEffectClrLst/>
+  </dgm:styleLbl>
+  <dgm:styleLbl name="solidBgAcc1">
+    <dgm:fillClrLst meth="repeat">
+      <a:schemeClr val="lt1"/>
+    </dgm:fillClrLst>
+    <dgm:linClrLst meth="repeat">
+      <a:schemeClr val="accent1"/>
+    </dgm:linClrLst>
+    <dgm:effectClrLst/>
+    <dgm:txLinClrLst/>
+    <dgm:txFillClrLst meth="repeat">
+      <a:schemeClr val="dk1"/>
+    </dgm:txFillClrLst>
+    <dgm:txEffectClrLst/>
+  </dgm:styleLbl>
+  <dgm:styleLbl name="fgAccFollowNode1">
+    <dgm:fillClrLst meth="repeat">
+      <a:schemeClr val="accent1">
+        <a:alpha val="90000"/>
+        <a:tint val="40000"/>
+      </a:schemeClr>
+    </dgm:fillClrLst>
+    <dgm:linClrLst meth="repeat">
+      <a:schemeClr val="accent1">
+        <a:alpha val="90000"/>
+        <a:tint val="40000"/>
+      </a:schemeClr>
+    </dgm:linClrLst>
+    <dgm:effectClrLst/>
+    <dgm:txLinClrLst/>
+    <dgm:txFillClrLst meth="repeat">
+      <a:schemeClr val="dk1"/>
+    </dgm:txFillClrLst>
+    <dgm:txEffectClrLst/>
+  </dgm:styleLbl>
+  <dgm:styleLbl name="alignAccFollowNode1">
+    <dgm:fillClrLst meth="repeat">
+      <a:schemeClr val="accent1">
+        <a:alpha val="90000"/>
+        <a:tint val="40000"/>
+      </a:schemeClr>
+    </dgm:fillClrLst>
+    <dgm:linClrLst meth="repeat">
+      <a:schemeClr val="accent1">
+        <a:alpha val="90000"/>
+        <a:tint val="40000"/>
+      </a:schemeClr>
+    </dgm:linClrLst>
+    <dgm:effectClrLst/>
+    <dgm:txLinClrLst/>
+    <dgm:txFillClrLst meth="repeat">
+      <a:schemeClr val="dk1"/>
+    </dgm:txFillClrLst>
+    <dgm:txEffectClrLst/>
+  </dgm:styleLbl>
+  <dgm:styleLbl name="bgAccFollowNode1">
+    <dgm:fillClrLst meth="repeat">
+      <a:schemeClr val="accent1">
+        <a:alpha val="90000"/>
+        <a:tint val="40000"/>
+      </a:schemeClr>
+    </dgm:fillClrLst>
+    <dgm:linClrLst meth="repeat">
+      <a:schemeClr val="accent1">
+        <a:alpha val="90000"/>
+        <a:tint val="40000"/>
+      </a:schemeClr>
+    </dgm:linClrLst>
+    <dgm:effectClrLst/>
+    <dgm:txLinClrLst/>
+    <dgm:txFillClrLst meth="repeat">
+      <a:schemeClr val="dk1"/>
+    </dgm:txFillClrLst>
+    <dgm:txEffectClrLst/>
+  </dgm:styleLbl>
+  <dgm:styleLbl name="fgAcc0">
+    <dgm:fillClrLst meth="repeat">
+      <a:schemeClr val="lt1">
+        <a:alpha val="90000"/>
+      </a:schemeClr>
+    </dgm:fillClrLst>
+    <dgm:linClrLst meth="repeat">
+      <a:schemeClr val="accent1"/>
+    </dgm:linClrLst>
+    <dgm:effectClrLst/>
+    <dgm:txLinClrLst/>
+    <dgm:txFillClrLst meth="repeat">
+      <a:schemeClr val="dk1"/>
+    </dgm:txFillClrLst>
+    <dgm:txEffectClrLst/>
+  </dgm:styleLbl>
+  <dgm:styleLbl name="fgAcc2">
+    <dgm:fillClrLst meth="repeat">
+      <a:schemeClr val="lt1">
+        <a:alpha val="90000"/>
+      </a:schemeClr>
+    </dgm:fillClrLst>
+    <dgm:linClrLst meth="repeat">
+      <a:schemeClr val="accent1"/>
+    </dgm:linClrLst>
+    <dgm:effectClrLst/>
+    <dgm:txLinClrLst/>
+    <dgm:txFillClrLst meth="repeat">
+      <a:schemeClr val="dk1"/>
+    </dgm:txFillClrLst>
+    <dgm:txEffectClrLst/>
+  </dgm:styleLbl>
+  <dgm:styleLbl name="fgAcc3">
+    <dgm:fillClrLst meth="repeat">
+      <a:schemeClr val="lt1">
+        <a:alpha val="90000"/>
+      </a:schemeClr>
+    </dgm:fillClrLst>
+    <dgm:linClrLst meth="repeat">
+      <a:schemeClr val="accent1"/>
+    </dgm:linClrLst>
+    <dgm:effectClrLst/>
+    <dgm:txLinClrLst/>
+    <dgm:txFillClrLst meth="repeat">
+      <a:schemeClr val="dk1"/>
+    </dgm:txFillClrLst>
+    <dgm:txEffectClrLst/>
+  </dgm:styleLbl>
+  <dgm:styleLbl name="fgAcc4">
+    <dgm:fillClrLst meth="repeat">
+      <a:schemeClr val="lt1">
+        <a:alpha val="90000"/>
+      </a:schemeClr>
+    </dgm:fillClrLst>
+    <dgm:linClrLst meth="repeat">
+      <a:schemeClr val="accent1"/>
+    </dgm:linClrLst>
+    <dgm:effectClrLst/>
+    <dgm:txLinClrLst/>
+    <dgm:txFillClrLst meth="repeat">
+      <a:schemeClr val="dk1"/>
+    </dgm:txFillClrLst>
+    <dgm:txEffectClrLst/>
+  </dgm:styleLbl>
+  <dgm:styleLbl name="bgShp">
+    <dgm:fillClrLst meth="repeat">
+      <a:schemeClr val="accent1">
+        <a:tint val="40000"/>
+      </a:schemeClr>
+    </dgm:fillClrLst>
+    <dgm:linClrLst meth="repeat">
+      <a:schemeClr val="accent1"/>
+    </dgm:linClrLst>
+    <dgm:effectClrLst/>
+    <dgm:txLinClrLst/>
+    <dgm:txFillClrLst meth="repeat">
+      <a:schemeClr val="dk1"/>
+    </dgm:txFillClrLst>
+    <dgm:txEffectClrLst/>
+  </dgm:styleLbl>
+  <dgm:styleLbl name="dkBgShp">
+    <dgm:fillClrLst meth="repeat">
+      <a:schemeClr val="accent1">
+        <a:shade val="80000"/>
+      </a:schemeClr>
+    </dgm:fillClrLst>
+    <dgm:linClrLst meth="repeat">
+      <a:schemeClr val="accent1"/>
+    </dgm:linClrLst>
+    <dgm:effectClrLst/>
+    <dgm:txLinClrLst/>
+    <dgm:txFillClrLst meth="repeat">
+      <a:schemeClr val="lt1"/>
+    </dgm:txFillClrLst>
+    <dgm:txEffectClrLst/>
+  </dgm:styleLbl>
+  <dgm:styleLbl name="trBgShp">
+    <dgm:fillClrLst meth="repeat">
+      <a:schemeClr val="accent1">
+        <a:tint val="50000"/>
+        <a:alpha val="40000"/>
+      </a:schemeClr>
+    </dgm:fillClrLst>
+    <dgm:linClrLst meth="repeat">
+      <a:schemeClr val="accent1"/>
+    </dgm:linClrLst>
+    <dgm:effectClrLst/>
+    <dgm:txLinClrLst/>
+    <dgm:txFillClrLst meth="repeat">
+      <a:schemeClr val="lt1"/>
+    </dgm:txFillClrLst>
+    <dgm:txEffectClrLst/>
+  </dgm:styleLbl>
+  <dgm:styleLbl name="fgShp">
+    <dgm:fillClrLst meth="repeat">
+      <a:schemeClr val="accent1">
+        <a:tint val="60000"/>
+      </a:schemeClr>
+    </dgm:fillClrLst>
+    <dgm:linClrLst meth="repeat">
+      <a:schemeClr val="lt1"/>
+    </dgm:linClrLst>
+    <dgm:effectClrLst/>
+    <dgm:txLinClrLst/>
+    <dgm:txFillClrLst meth="repeat">
+      <a:schemeClr val="dk1"/>
+    </dgm:txFillClrLst>
+    <dgm:txEffectClrLst/>
+  </dgm:styleLbl>
+  <dgm:styleLbl name="revTx">
+    <dgm:fillClrLst meth="repeat">
+      <a:schemeClr val="lt1">
+        <a:alpha val="0"/>
+      </a:schemeClr>
+    </dgm:fillClrLst>
+    <dgm:linClrLst meth="repeat">
+      <a:schemeClr val="dk1">
+        <a:alpha val="0"/>
+      </a:schemeClr>
+    </dgm:linClrLst>
+    <dgm:effectClrLst/>
+    <dgm:txLinClrLst/>
+    <dgm:txFillClrLst meth="repeat">
+      <a:schemeClr val="tx1"/>
+    </dgm:txFillClrLst>
+    <dgm:txEffectClrLst/>
+  </dgm:styleLbl>
+</dgm:colorsDef>
+</file>
+
+<file path=ppt/diagrams/colors15.xml><?xml version="1.0" encoding="utf-8"?>
 <dgm:colorsDef xmlns:dgm="http://schemas.openxmlformats.org/drawingml/2006/diagram" xmlns:a="http://schemas.openxmlformats.org/drawingml/2006/main" uniqueId="urn:microsoft.com/office/officeart/2005/8/colors/accent1_2">
   <dgm:title val=""/>
   <dgm:desc val=""/>
@@ -10950,6 +11701,253 @@
 </file>
 
 <file path=ppt/diagrams/data10.xml><?xml version="1.0" encoding="utf-8"?>
+<dgm:dataModel xmlns:dgm="http://schemas.openxmlformats.org/drawingml/2006/diagram" xmlns:a="http://schemas.openxmlformats.org/drawingml/2006/main">
+  <dgm:ptLst>
+    <dgm:pt modelId="{6EC4E029-039E-4982-AA22-23E97750D620}" type="doc">
+      <dgm:prSet loTypeId="urn:microsoft.com/office/officeart/2005/8/layout/vList2" loCatId="list" qsTypeId="urn:microsoft.com/office/officeart/2005/8/quickstyle/simple1" qsCatId="simple" csTypeId="urn:microsoft.com/office/officeart/2005/8/colors/accent1_2" csCatId="accent1" phldr="1"/>
+      <dgm:spPr/>
+      <dgm:t>
+        <a:bodyPr/>
+        <a:lstStyle/>
+        <a:p>
+          <a:endParaRPr lang="zh-CN" altLang="en-US"/>
+        </a:p>
+      </dgm:t>
+    </dgm:pt>
+    <dgm:pt modelId="{3D8CC648-9E66-4DE2-B1D1-AB1B9A436307}">
+      <dgm:prSet/>
+      <dgm:spPr/>
+      <dgm:t>
+        <a:bodyPr/>
+        <a:lstStyle/>
+        <a:p>
+          <a:r>
+            <a:rPr lang="zh-CN" dirty="0"/>
+            <a:t>当 </a:t>
+          </a:r>
+          <a:r>
+            <a:rPr lang="en-US" dirty="0"/>
+            <a:t>Pod </a:t>
+          </a:r>
+          <a:r>
+            <a:rPr lang="zh-CN" dirty="0"/>
+            <a:t>被创建之后，就会进入健康检查状态，当 </a:t>
+          </a:r>
+          <a:r>
+            <a:rPr lang="en-US" dirty="0"/>
+            <a:t>Kubernetes </a:t>
+          </a:r>
+          <a:r>
+            <a:rPr lang="zh-CN" dirty="0"/>
+            <a:t>确定当前 </a:t>
+          </a:r>
+          <a:r>
+            <a:rPr lang="en-US" dirty="0"/>
+            <a:t>Pod </a:t>
+          </a:r>
+          <a:r>
+            <a:rPr lang="zh-CN" dirty="0"/>
+            <a:t>已经能够接受外部的请求时，才会将流量打到新的 </a:t>
+          </a:r>
+          <a:r>
+            <a:rPr lang="en-US" dirty="0"/>
+            <a:t>Pod </a:t>
+          </a:r>
+          <a:r>
+            <a:rPr lang="zh-CN" dirty="0"/>
+            <a:t>上并继续对外提供服务，在这期间如果发生了错误就可能会触发重启机制，在 </a:t>
+          </a:r>
+          <a:r>
+            <a:rPr lang="en-US" dirty="0"/>
+            <a:t>Pod </a:t>
+          </a:r>
+          <a:r>
+            <a:rPr lang="zh-CN" dirty="0"/>
+            <a:t>被删除之前都会触发一个 </a:t>
+          </a:r>
+          <a:r>
+            <a:rPr lang="en-US" dirty="0" err="1"/>
+            <a:t>PreStop</a:t>
+          </a:r>
+          <a:r>
+            <a:rPr lang="en-US" dirty="0"/>
+            <a:t> </a:t>
+          </a:r>
+          <a:r>
+            <a:rPr lang="zh-CN" dirty="0"/>
+            <a:t>的钩子，其中的方法完成之后 </a:t>
+          </a:r>
+          <a:r>
+            <a:rPr lang="en-US" dirty="0"/>
+            <a:t>Pod </a:t>
+          </a:r>
+          <a:r>
+            <a:rPr lang="zh-CN" dirty="0"/>
+            <a:t>才会被删除，接下来我们就会按照这里的顺序依次介绍 </a:t>
+          </a:r>
+          <a:r>
+            <a:rPr lang="en-US" dirty="0"/>
+            <a:t>Pod 『</a:t>
+          </a:r>
+          <a:r>
+            <a:rPr lang="zh-CN" dirty="0"/>
+            <a:t>从生到死</a:t>
+          </a:r>
+          <a:r>
+            <a:rPr lang="en-US" dirty="0"/>
+            <a:t>』</a:t>
+          </a:r>
+          <a:r>
+            <a:rPr lang="zh-CN" dirty="0"/>
+            <a:t>的过程。</a:t>
+          </a:r>
+        </a:p>
+      </dgm:t>
+    </dgm:pt>
+    <dgm:pt modelId="{A443C5D5-6DEA-4875-847B-E5F074DF1EC9}" type="parTrans" cxnId="{35F67286-17A6-4F95-897D-B84372F03A76}">
+      <dgm:prSet/>
+      <dgm:spPr/>
+      <dgm:t>
+        <a:bodyPr/>
+        <a:lstStyle/>
+        <a:p>
+          <a:endParaRPr lang="zh-CN" altLang="en-US"/>
+        </a:p>
+      </dgm:t>
+    </dgm:pt>
+    <dgm:pt modelId="{C50A6D71-F060-44F9-AB99-8900D570C24B}" type="sibTrans" cxnId="{35F67286-17A6-4F95-897D-B84372F03A76}">
+      <dgm:prSet/>
+      <dgm:spPr/>
+      <dgm:t>
+        <a:bodyPr/>
+        <a:lstStyle/>
+        <a:p>
+          <a:endParaRPr lang="zh-CN" altLang="en-US"/>
+        </a:p>
+      </dgm:t>
+    </dgm:pt>
+    <dgm:pt modelId="{3E142A25-BE83-49D1-AC1D-EFE1674F94A2}">
+      <dgm:prSet/>
+      <dgm:spPr/>
+      <dgm:t>
+        <a:bodyPr/>
+        <a:lstStyle/>
+        <a:p>
+          <a:r>
+            <a:rPr lang="zh-CN" altLang="en-US" b="0" i="0" dirty="0"/>
+            <a:t>想要深入理解 </a:t>
+          </a:r>
+          <a:r>
+            <a:rPr lang="en-US" b="0" i="0" dirty="0"/>
+            <a:t>Pod </a:t>
+          </a:r>
+          <a:r>
+            <a:rPr lang="zh-CN" altLang="en-US" b="0" i="0" dirty="0"/>
+            <a:t>的实现原理，最好最快的办法就是从 </a:t>
+          </a:r>
+          <a:r>
+            <a:rPr lang="en-US" b="0" i="0" dirty="0"/>
+            <a:t>Pod </a:t>
+          </a:r>
+          <a:r>
+            <a:rPr lang="zh-CN" altLang="en-US" b="0" i="0" dirty="0"/>
+            <a:t>的生命周期入手，通过理解 </a:t>
+          </a:r>
+          <a:r>
+            <a:rPr lang="en-US" b="0" i="0" dirty="0"/>
+            <a:t>Pod </a:t>
+          </a:r>
+          <a:r>
+            <a:rPr lang="zh-CN" altLang="en-US" b="0" i="0" dirty="0"/>
+            <a:t>创建、重启和删除的原理我们最终就能够系统地掌握 </a:t>
+          </a:r>
+          <a:r>
+            <a:rPr lang="en-US" b="0" i="0" dirty="0"/>
+            <a:t>Pod </a:t>
+          </a:r>
+          <a:r>
+            <a:rPr lang="zh-CN" altLang="en-US" b="0" i="0" dirty="0"/>
+            <a:t>的生命周期与核心原理。</a:t>
+          </a:r>
+          <a:endParaRPr lang="zh-CN" altLang="en-US" dirty="0"/>
+        </a:p>
+      </dgm:t>
+    </dgm:pt>
+    <dgm:pt modelId="{D0FFD66F-1131-41FC-8422-DB5A1150D79C}" type="parTrans" cxnId="{9C0D8899-6B16-4CF8-B3E4-CD7D3A3E8B0D}">
+      <dgm:prSet/>
+      <dgm:spPr/>
+      <dgm:t>
+        <a:bodyPr/>
+        <a:lstStyle/>
+        <a:p>
+          <a:endParaRPr lang="zh-CN" altLang="en-US"/>
+        </a:p>
+      </dgm:t>
+    </dgm:pt>
+    <dgm:pt modelId="{C9808E1E-84AD-4FA7-9B31-D3DABCA3993E}" type="sibTrans" cxnId="{9C0D8899-6B16-4CF8-B3E4-CD7D3A3E8B0D}">
+      <dgm:prSet/>
+      <dgm:spPr/>
+      <dgm:t>
+        <a:bodyPr/>
+        <a:lstStyle/>
+        <a:p>
+          <a:endParaRPr lang="zh-CN" altLang="en-US"/>
+        </a:p>
+      </dgm:t>
+    </dgm:pt>
+    <dgm:pt modelId="{ACF5DBEC-A2C4-434F-BE1D-7C0555EECDB1}" type="pres">
+      <dgm:prSet presAssocID="{6EC4E029-039E-4982-AA22-23E97750D620}" presName="linear" presStyleCnt="0">
+        <dgm:presLayoutVars>
+          <dgm:animLvl val="lvl"/>
+          <dgm:resizeHandles val="exact"/>
+        </dgm:presLayoutVars>
+      </dgm:prSet>
+      <dgm:spPr/>
+    </dgm:pt>
+    <dgm:pt modelId="{7F7B99DC-F75D-4A7E-855B-5B05F3CDD4A5}" type="pres">
+      <dgm:prSet presAssocID="{3E142A25-BE83-49D1-AC1D-EFE1674F94A2}" presName="parentText" presStyleLbl="node1" presStyleIdx="0" presStyleCnt="2">
+        <dgm:presLayoutVars>
+          <dgm:chMax val="0"/>
+          <dgm:bulletEnabled val="1"/>
+        </dgm:presLayoutVars>
+      </dgm:prSet>
+      <dgm:spPr/>
+    </dgm:pt>
+    <dgm:pt modelId="{82998B98-A613-4CF7-9593-77395DE33809}" type="pres">
+      <dgm:prSet presAssocID="{C9808E1E-84AD-4FA7-9B31-D3DABCA3993E}" presName="spacer" presStyleCnt="0"/>
+      <dgm:spPr/>
+    </dgm:pt>
+    <dgm:pt modelId="{1BB3112F-B381-4F3D-AD42-CD51E5148602}" type="pres">
+      <dgm:prSet presAssocID="{3D8CC648-9E66-4DE2-B1D1-AB1B9A436307}" presName="parentText" presStyleLbl="node1" presStyleIdx="1" presStyleCnt="2">
+        <dgm:presLayoutVars>
+          <dgm:chMax val="0"/>
+          <dgm:bulletEnabled val="1"/>
+        </dgm:presLayoutVars>
+      </dgm:prSet>
+      <dgm:spPr/>
+    </dgm:pt>
+  </dgm:ptLst>
+  <dgm:cxnLst>
+    <dgm:cxn modelId="{B033A67B-6A47-44AA-8C81-087876D7F8B1}" type="presOf" srcId="{3D8CC648-9E66-4DE2-B1D1-AB1B9A436307}" destId="{1BB3112F-B381-4F3D-AD42-CD51E5148602}" srcOrd="0" destOrd="0" presId="urn:microsoft.com/office/officeart/2005/8/layout/vList2"/>
+    <dgm:cxn modelId="{35F67286-17A6-4F95-897D-B84372F03A76}" srcId="{6EC4E029-039E-4982-AA22-23E97750D620}" destId="{3D8CC648-9E66-4DE2-B1D1-AB1B9A436307}" srcOrd="1" destOrd="0" parTransId="{A443C5D5-6DEA-4875-847B-E5F074DF1EC9}" sibTransId="{C50A6D71-F060-44F9-AB99-8900D570C24B}"/>
+    <dgm:cxn modelId="{DA786997-F35B-4846-82A6-8E3953D3C652}" type="presOf" srcId="{6EC4E029-039E-4982-AA22-23E97750D620}" destId="{ACF5DBEC-A2C4-434F-BE1D-7C0555EECDB1}" srcOrd="0" destOrd="0" presId="urn:microsoft.com/office/officeart/2005/8/layout/vList2"/>
+    <dgm:cxn modelId="{9C0D8899-6B16-4CF8-B3E4-CD7D3A3E8B0D}" srcId="{6EC4E029-039E-4982-AA22-23E97750D620}" destId="{3E142A25-BE83-49D1-AC1D-EFE1674F94A2}" srcOrd="0" destOrd="0" parTransId="{D0FFD66F-1131-41FC-8422-DB5A1150D79C}" sibTransId="{C9808E1E-84AD-4FA7-9B31-D3DABCA3993E}"/>
+    <dgm:cxn modelId="{335D50F2-6983-4841-9E76-2E6DA7101704}" type="presOf" srcId="{3E142A25-BE83-49D1-AC1D-EFE1674F94A2}" destId="{7F7B99DC-F75D-4A7E-855B-5B05F3CDD4A5}" srcOrd="0" destOrd="0" presId="urn:microsoft.com/office/officeart/2005/8/layout/vList2"/>
+    <dgm:cxn modelId="{BD283389-206C-4A0F-AAB4-C42BEB70C326}" type="presParOf" srcId="{ACF5DBEC-A2C4-434F-BE1D-7C0555EECDB1}" destId="{7F7B99DC-F75D-4A7E-855B-5B05F3CDD4A5}" srcOrd="0" destOrd="0" presId="urn:microsoft.com/office/officeart/2005/8/layout/vList2"/>
+    <dgm:cxn modelId="{6C7509EF-1A66-429D-A2BB-93864FDC68E2}" type="presParOf" srcId="{ACF5DBEC-A2C4-434F-BE1D-7C0555EECDB1}" destId="{82998B98-A613-4CF7-9593-77395DE33809}" srcOrd="1" destOrd="0" presId="urn:microsoft.com/office/officeart/2005/8/layout/vList2"/>
+    <dgm:cxn modelId="{0705AAB0-6C28-4ECA-B6AB-E53B47790F03}" type="presParOf" srcId="{ACF5DBEC-A2C4-434F-BE1D-7C0555EECDB1}" destId="{1BB3112F-B381-4F3D-AD42-CD51E5148602}" srcOrd="2" destOrd="0" presId="urn:microsoft.com/office/officeart/2005/8/layout/vList2"/>
+  </dgm:cxnLst>
+  <dgm:bg/>
+  <dgm:whole/>
+  <dgm:extLst>
+    <a:ext uri="http://schemas.microsoft.com/office/drawing/2008/diagram">
+      <dsp:dataModelExt xmlns:dsp="http://schemas.microsoft.com/office/drawing/2008/diagram" relId="rId7" minVer="http://schemas.openxmlformats.org/drawingml/2006/diagram"/>
+    </a:ext>
+  </dgm:extLst>
+</dgm:dataModel>
+</file>
+
+<file path=ppt/diagrams/data11.xml><?xml version="1.0" encoding="utf-8"?>
 <dgm:dataModel xmlns:dgm="http://schemas.openxmlformats.org/drawingml/2006/diagram" xmlns:a="http://schemas.openxmlformats.org/drawingml/2006/main">
   <dgm:ptLst>
     <dgm:pt modelId="{0E0009B2-43D6-4EAB-987A-F3CE82F3A35A}" type="doc">
@@ -11275,7 +12273,7 @@
 </dgm:dataModel>
 </file>
 
-<file path=ppt/diagrams/data11.xml><?xml version="1.0" encoding="utf-8"?>
+<file path=ppt/diagrams/data12.xml><?xml version="1.0" encoding="utf-8"?>
 <dgm:dataModel xmlns:dgm="http://schemas.openxmlformats.org/drawingml/2006/diagram" xmlns:a="http://schemas.openxmlformats.org/drawingml/2006/main">
   <dgm:ptLst>
     <dgm:pt modelId="{18F1B22C-A4D4-4241-8103-385A4AF7B970}" type="doc">
@@ -11455,7 +12453,7 @@
 </dgm:dataModel>
 </file>
 
-<file path=ppt/diagrams/data12.xml><?xml version="1.0" encoding="utf-8"?>
+<file path=ppt/diagrams/data13.xml><?xml version="1.0" encoding="utf-8"?>
 <dgm:dataModel xmlns:dgm="http://schemas.openxmlformats.org/drawingml/2006/diagram" xmlns:a="http://schemas.openxmlformats.org/drawingml/2006/main">
   <dgm:ptLst>
     <dgm:pt modelId="{1C336287-000A-4721-A61E-260975455955}" type="doc">
@@ -11797,7 +12795,7 @@
 </dgm:dataModel>
 </file>
 
-<file path=ppt/diagrams/data13.xml><?xml version="1.0" encoding="utf-8"?>
+<file path=ppt/diagrams/data14.xml><?xml version="1.0" encoding="utf-8"?>
 <dgm:dataModel xmlns:dgm="http://schemas.openxmlformats.org/drawingml/2006/diagram" xmlns:a="http://schemas.openxmlformats.org/drawingml/2006/main">
   <dgm:ptLst>
     <dgm:pt modelId="{6CECD71F-FEC8-441D-B956-3473183BB51E}" type="doc">
@@ -12023,7 +13021,7 @@
 </dgm:dataModel>
 </file>
 
-<file path=ppt/diagrams/data14.xml><?xml version="1.0" encoding="utf-8"?>
+<file path=ppt/diagrams/data15.xml><?xml version="1.0" encoding="utf-8"?>
 <dgm:dataModel xmlns:dgm="http://schemas.openxmlformats.org/drawingml/2006/diagram" xmlns:a="http://schemas.openxmlformats.org/drawingml/2006/main">
   <dgm:ptLst>
     <dgm:pt modelId="{6D12DA3E-543C-4D24-AF20-34FAC1D6887A}" type="doc">
@@ -14620,6 +15618,281 @@
       <dsp:cNvGrpSpPr/>
     </dsp:nvGrpSpPr>
     <dsp:grpSpPr/>
+    <dsp:sp modelId="{7F7B99DC-F75D-4A7E-855B-5B05F3CDD4A5}">
+      <dsp:nvSpPr>
+        <dsp:cNvPr id="0" name=""/>
+        <dsp:cNvSpPr/>
+      </dsp:nvSpPr>
+      <dsp:spPr>
+        <a:xfrm>
+          <a:off x="0" y="196282"/>
+          <a:ext cx="4184034" cy="1725384"/>
+        </a:xfrm>
+        <a:prstGeom prst="roundRect">
+          <a:avLst/>
+        </a:prstGeom>
+        <a:solidFill>
+          <a:schemeClr val="accent1">
+            <a:hueOff val="0"/>
+            <a:satOff val="0"/>
+            <a:lumOff val="0"/>
+            <a:alphaOff val="0"/>
+          </a:schemeClr>
+        </a:solidFill>
+        <a:ln w="19050" cap="rnd" cmpd="sng" algn="ctr">
+          <a:solidFill>
+            <a:schemeClr val="lt1">
+              <a:hueOff val="0"/>
+              <a:satOff val="0"/>
+              <a:lumOff val="0"/>
+              <a:alphaOff val="0"/>
+            </a:schemeClr>
+          </a:solidFill>
+          <a:prstDash val="solid"/>
+        </a:ln>
+        <a:effectLst/>
+      </dsp:spPr>
+      <dsp:style>
+        <a:lnRef idx="2">
+          <a:scrgbClr r="0" g="0" b="0"/>
+        </a:lnRef>
+        <a:fillRef idx="1">
+          <a:scrgbClr r="0" g="0" b="0"/>
+        </a:fillRef>
+        <a:effectRef idx="0">
+          <a:scrgbClr r="0" g="0" b="0"/>
+        </a:effectRef>
+        <a:fontRef idx="minor">
+          <a:schemeClr val="lt1"/>
+        </a:fontRef>
+      </dsp:style>
+      <dsp:txBody>
+        <a:bodyPr spcFirstLastPara="0" vert="horz" wrap="square" lIns="49530" tIns="49530" rIns="49530" bIns="49530" numCol="1" spcCol="1270" anchor="ctr" anchorCtr="0">
+          <a:noAutofit/>
+        </a:bodyPr>
+        <a:lstStyle/>
+        <a:p>
+          <a:pPr marL="0" lvl="0" indent="0" algn="l" defTabSz="577850">
+            <a:lnSpc>
+              <a:spcPct val="90000"/>
+            </a:lnSpc>
+            <a:spcBef>
+              <a:spcPct val="0"/>
+            </a:spcBef>
+            <a:spcAft>
+              <a:spcPct val="35000"/>
+            </a:spcAft>
+            <a:buNone/>
+          </a:pPr>
+          <a:r>
+            <a:rPr lang="zh-CN" altLang="en-US" sz="1300" b="0" i="0" kern="1200" dirty="0"/>
+            <a:t>想要深入理解 </a:t>
+          </a:r>
+          <a:r>
+            <a:rPr lang="en-US" sz="1300" b="0" i="0" kern="1200" dirty="0"/>
+            <a:t>Pod </a:t>
+          </a:r>
+          <a:r>
+            <a:rPr lang="zh-CN" altLang="en-US" sz="1300" b="0" i="0" kern="1200" dirty="0"/>
+            <a:t>的实现原理，最好最快的办法就是从 </a:t>
+          </a:r>
+          <a:r>
+            <a:rPr lang="en-US" sz="1300" b="0" i="0" kern="1200" dirty="0"/>
+            <a:t>Pod </a:t>
+          </a:r>
+          <a:r>
+            <a:rPr lang="zh-CN" altLang="en-US" sz="1300" b="0" i="0" kern="1200" dirty="0"/>
+            <a:t>的生命周期入手，通过理解 </a:t>
+          </a:r>
+          <a:r>
+            <a:rPr lang="en-US" sz="1300" b="0" i="0" kern="1200" dirty="0"/>
+            <a:t>Pod </a:t>
+          </a:r>
+          <a:r>
+            <a:rPr lang="zh-CN" altLang="en-US" sz="1300" b="0" i="0" kern="1200" dirty="0"/>
+            <a:t>创建、重启和删除的原理我们最终就能够系统地掌握 </a:t>
+          </a:r>
+          <a:r>
+            <a:rPr lang="en-US" sz="1300" b="0" i="0" kern="1200" dirty="0"/>
+            <a:t>Pod </a:t>
+          </a:r>
+          <a:r>
+            <a:rPr lang="zh-CN" altLang="en-US" sz="1300" b="0" i="0" kern="1200" dirty="0"/>
+            <a:t>的生命周期与核心原理。</a:t>
+          </a:r>
+          <a:endParaRPr lang="zh-CN" altLang="en-US" sz="1300" kern="1200" dirty="0"/>
+        </a:p>
+      </dsp:txBody>
+      <dsp:txXfrm>
+        <a:off x="84226" y="280508"/>
+        <a:ext cx="4015582" cy="1556932"/>
+      </dsp:txXfrm>
+    </dsp:sp>
+    <dsp:sp modelId="{1BB3112F-B381-4F3D-AD42-CD51E5148602}">
+      <dsp:nvSpPr>
+        <dsp:cNvPr id="0" name=""/>
+        <dsp:cNvSpPr/>
+      </dsp:nvSpPr>
+      <dsp:spPr>
+        <a:xfrm>
+          <a:off x="0" y="1959106"/>
+          <a:ext cx="4184034" cy="1725384"/>
+        </a:xfrm>
+        <a:prstGeom prst="roundRect">
+          <a:avLst/>
+        </a:prstGeom>
+        <a:solidFill>
+          <a:schemeClr val="accent1">
+            <a:hueOff val="0"/>
+            <a:satOff val="0"/>
+            <a:lumOff val="0"/>
+            <a:alphaOff val="0"/>
+          </a:schemeClr>
+        </a:solidFill>
+        <a:ln w="19050" cap="rnd" cmpd="sng" algn="ctr">
+          <a:solidFill>
+            <a:schemeClr val="lt1">
+              <a:hueOff val="0"/>
+              <a:satOff val="0"/>
+              <a:lumOff val="0"/>
+              <a:alphaOff val="0"/>
+            </a:schemeClr>
+          </a:solidFill>
+          <a:prstDash val="solid"/>
+        </a:ln>
+        <a:effectLst/>
+      </dsp:spPr>
+      <dsp:style>
+        <a:lnRef idx="2">
+          <a:scrgbClr r="0" g="0" b="0"/>
+        </a:lnRef>
+        <a:fillRef idx="1">
+          <a:scrgbClr r="0" g="0" b="0"/>
+        </a:fillRef>
+        <a:effectRef idx="0">
+          <a:scrgbClr r="0" g="0" b="0"/>
+        </a:effectRef>
+        <a:fontRef idx="minor">
+          <a:schemeClr val="lt1"/>
+        </a:fontRef>
+      </dsp:style>
+      <dsp:txBody>
+        <a:bodyPr spcFirstLastPara="0" vert="horz" wrap="square" lIns="49530" tIns="49530" rIns="49530" bIns="49530" numCol="1" spcCol="1270" anchor="ctr" anchorCtr="0">
+          <a:noAutofit/>
+        </a:bodyPr>
+        <a:lstStyle/>
+        <a:p>
+          <a:pPr marL="0" lvl="0" indent="0" algn="l" defTabSz="577850">
+            <a:lnSpc>
+              <a:spcPct val="90000"/>
+            </a:lnSpc>
+            <a:spcBef>
+              <a:spcPct val="0"/>
+            </a:spcBef>
+            <a:spcAft>
+              <a:spcPct val="35000"/>
+            </a:spcAft>
+            <a:buNone/>
+          </a:pPr>
+          <a:r>
+            <a:rPr lang="zh-CN" sz="1300" kern="1200" dirty="0"/>
+            <a:t>当 </a:t>
+          </a:r>
+          <a:r>
+            <a:rPr lang="en-US" sz="1300" kern="1200" dirty="0"/>
+            <a:t>Pod </a:t>
+          </a:r>
+          <a:r>
+            <a:rPr lang="zh-CN" sz="1300" kern="1200" dirty="0"/>
+            <a:t>被创建之后，就会进入健康检查状态，当 </a:t>
+          </a:r>
+          <a:r>
+            <a:rPr lang="en-US" sz="1300" kern="1200" dirty="0"/>
+            <a:t>Kubernetes </a:t>
+          </a:r>
+          <a:r>
+            <a:rPr lang="zh-CN" sz="1300" kern="1200" dirty="0"/>
+            <a:t>确定当前 </a:t>
+          </a:r>
+          <a:r>
+            <a:rPr lang="en-US" sz="1300" kern="1200" dirty="0"/>
+            <a:t>Pod </a:t>
+          </a:r>
+          <a:r>
+            <a:rPr lang="zh-CN" sz="1300" kern="1200" dirty="0"/>
+            <a:t>已经能够接受外部的请求时，才会将流量打到新的 </a:t>
+          </a:r>
+          <a:r>
+            <a:rPr lang="en-US" sz="1300" kern="1200" dirty="0"/>
+            <a:t>Pod </a:t>
+          </a:r>
+          <a:r>
+            <a:rPr lang="zh-CN" sz="1300" kern="1200" dirty="0"/>
+            <a:t>上并继续对外提供服务，在这期间如果发生了错误就可能会触发重启机制，在 </a:t>
+          </a:r>
+          <a:r>
+            <a:rPr lang="en-US" sz="1300" kern="1200" dirty="0"/>
+            <a:t>Pod </a:t>
+          </a:r>
+          <a:r>
+            <a:rPr lang="zh-CN" sz="1300" kern="1200" dirty="0"/>
+            <a:t>被删除之前都会触发一个 </a:t>
+          </a:r>
+          <a:r>
+            <a:rPr lang="en-US" sz="1300" kern="1200" dirty="0" err="1"/>
+            <a:t>PreStop</a:t>
+          </a:r>
+          <a:r>
+            <a:rPr lang="en-US" sz="1300" kern="1200" dirty="0"/>
+            <a:t> </a:t>
+          </a:r>
+          <a:r>
+            <a:rPr lang="zh-CN" sz="1300" kern="1200" dirty="0"/>
+            <a:t>的钩子，其中的方法完成之后 </a:t>
+          </a:r>
+          <a:r>
+            <a:rPr lang="en-US" sz="1300" kern="1200" dirty="0"/>
+            <a:t>Pod </a:t>
+          </a:r>
+          <a:r>
+            <a:rPr lang="zh-CN" sz="1300" kern="1200" dirty="0"/>
+            <a:t>才会被删除，接下来我们就会按照这里的顺序依次介绍 </a:t>
+          </a:r>
+          <a:r>
+            <a:rPr lang="en-US" sz="1300" kern="1200" dirty="0"/>
+            <a:t>Pod 『</a:t>
+          </a:r>
+          <a:r>
+            <a:rPr lang="zh-CN" sz="1300" kern="1200" dirty="0"/>
+            <a:t>从生到死</a:t>
+          </a:r>
+          <a:r>
+            <a:rPr lang="en-US" sz="1300" kern="1200" dirty="0"/>
+            <a:t>』</a:t>
+          </a:r>
+          <a:r>
+            <a:rPr lang="zh-CN" sz="1300" kern="1200" dirty="0"/>
+            <a:t>的过程。</a:t>
+          </a:r>
+        </a:p>
+      </dsp:txBody>
+      <dsp:txXfrm>
+        <a:off x="84226" y="2043332"/>
+        <a:ext cx="4015582" cy="1556932"/>
+      </dsp:txXfrm>
+    </dsp:sp>
+  </dsp:spTree>
+</dsp:drawing>
+</file>
+
+<file path=ppt/diagrams/drawing11.xml><?xml version="1.0" encoding="utf-8"?>
+<dsp:drawing xmlns:dgm="http://schemas.openxmlformats.org/drawingml/2006/diagram" xmlns:dsp="http://schemas.microsoft.com/office/drawing/2008/diagram" xmlns:a="http://schemas.openxmlformats.org/drawingml/2006/main">
+  <dsp:spTree>
+    <dsp:nvGrpSpPr>
+      <dsp:cNvPr id="0" name=""/>
+      <dsp:cNvGrpSpPr/>
+    </dsp:nvGrpSpPr>
+    <dsp:grpSpPr/>
     <dsp:sp modelId="{36848C7B-6AB9-4B5D-85B2-8131F9FF0F3C}">
       <dsp:nvSpPr>
         <dsp:cNvPr id="0" name=""/>
@@ -15038,7 +16311,7 @@
 </dsp:drawing>
 </file>
 
-<file path=ppt/diagrams/drawing11.xml><?xml version="1.0" encoding="utf-8"?>
+<file path=ppt/diagrams/drawing12.xml><?xml version="1.0" encoding="utf-8"?>
 <dsp:drawing xmlns:dgm="http://schemas.openxmlformats.org/drawingml/2006/diagram" xmlns:dsp="http://schemas.microsoft.com/office/drawing/2008/diagram" xmlns:a="http://schemas.openxmlformats.org/drawingml/2006/main">
   <dsp:spTree>
     <dsp:nvGrpSpPr>
@@ -15294,7 +16567,7 @@
 </dsp:drawing>
 </file>
 
-<file path=ppt/diagrams/drawing12.xml><?xml version="1.0" encoding="utf-8"?>
+<file path=ppt/diagrams/drawing13.xml><?xml version="1.0" encoding="utf-8"?>
 <dsp:drawing xmlns:dgm="http://schemas.openxmlformats.org/drawingml/2006/diagram" xmlns:dsp="http://schemas.microsoft.com/office/drawing/2008/diagram" xmlns:a="http://schemas.openxmlformats.org/drawingml/2006/main">
   <dsp:spTree>
     <dsp:nvGrpSpPr>
@@ -15803,7 +17076,7 @@
 </dsp:drawing>
 </file>
 
-<file path=ppt/diagrams/drawing13.xml><?xml version="1.0" encoding="utf-8"?>
+<file path=ppt/diagrams/drawing14.xml><?xml version="1.0" encoding="utf-8"?>
 <dsp:drawing xmlns:dgm="http://schemas.openxmlformats.org/drawingml/2006/diagram" xmlns:dsp="http://schemas.microsoft.com/office/drawing/2008/diagram" xmlns:a="http://schemas.openxmlformats.org/drawingml/2006/main">
   <dsp:spTree>
     <dsp:nvGrpSpPr>
@@ -16057,7 +17330,7 @@
 </dsp:drawing>
 </file>
 
-<file path=ppt/diagrams/drawing14.xml><?xml version="1.0" encoding="utf-8"?>
+<file path=ppt/diagrams/drawing15.xml><?xml version="1.0" encoding="utf-8"?>
 <dsp:drawing xmlns:dgm="http://schemas.openxmlformats.org/drawingml/2006/diagram" xmlns:dsp="http://schemas.microsoft.com/office/drawing/2008/diagram" xmlns:a="http://schemas.openxmlformats.org/drawingml/2006/main">
   <dsp:spTree>
     <dsp:nvGrpSpPr>
@@ -19455,6 +20728,173 @@
 </file>
 
 <file path=ppt/diagrams/layout12.xml><?xml version="1.0" encoding="utf-8"?>
+<dgm:layoutDef xmlns:dgm="http://schemas.openxmlformats.org/drawingml/2006/diagram" xmlns:a="http://schemas.openxmlformats.org/drawingml/2006/main" uniqueId="urn:microsoft.com/office/officeart/2005/8/layout/vList2">
+  <dgm:title val=""/>
+  <dgm:desc val=""/>
+  <dgm:catLst>
+    <dgm:cat type="list" pri="3000"/>
+    <dgm:cat type="convert" pri="1000"/>
+  </dgm:catLst>
+  <dgm:sampData>
+    <dgm:dataModel>
+      <dgm:ptLst>
+        <dgm:pt modelId="0" type="doc"/>
+        <dgm:pt modelId="1">
+          <dgm:prSet phldr="1"/>
+        </dgm:pt>
+        <dgm:pt modelId="11">
+          <dgm:prSet phldr="1"/>
+        </dgm:pt>
+        <dgm:pt modelId="2">
+          <dgm:prSet phldr="1"/>
+        </dgm:pt>
+        <dgm:pt modelId="21">
+          <dgm:prSet phldr="1"/>
+        </dgm:pt>
+      </dgm:ptLst>
+      <dgm:cxnLst>
+        <dgm:cxn modelId="4" srcId="0" destId="1" srcOrd="0" destOrd="0"/>
+        <dgm:cxn modelId="5" srcId="0" destId="2" srcOrd="1" destOrd="0"/>
+        <dgm:cxn modelId="12" srcId="1" destId="11" srcOrd="0" destOrd="0"/>
+        <dgm:cxn modelId="23" srcId="2" destId="21" srcOrd="0" destOrd="0"/>
+      </dgm:cxnLst>
+      <dgm:bg/>
+      <dgm:whole/>
+    </dgm:dataModel>
+  </dgm:sampData>
+  <dgm:styleData>
+    <dgm:dataModel>
+      <dgm:ptLst>
+        <dgm:pt modelId="0" type="doc"/>
+        <dgm:pt modelId="1"/>
+        <dgm:pt modelId="2"/>
+      </dgm:ptLst>
+      <dgm:cxnLst>
+        <dgm:cxn modelId="3" srcId="0" destId="1" srcOrd="0" destOrd="0"/>
+        <dgm:cxn modelId="4" srcId="0" destId="2" srcOrd="1" destOrd="0"/>
+      </dgm:cxnLst>
+      <dgm:bg/>
+      <dgm:whole/>
+    </dgm:dataModel>
+  </dgm:styleData>
+  <dgm:clrData>
+    <dgm:dataModel>
+      <dgm:ptLst>
+        <dgm:pt modelId="0" type="doc"/>
+        <dgm:pt modelId="1"/>
+        <dgm:pt modelId="2"/>
+        <dgm:pt modelId="3"/>
+        <dgm:pt modelId="4"/>
+      </dgm:ptLst>
+      <dgm:cxnLst>
+        <dgm:cxn modelId="5" srcId="0" destId="1" srcOrd="0" destOrd="0"/>
+        <dgm:cxn modelId="6" srcId="0" destId="2" srcOrd="1" destOrd="0"/>
+        <dgm:cxn modelId="7" srcId="0" destId="3" srcOrd="2" destOrd="0"/>
+        <dgm:cxn modelId="8" srcId="0" destId="4" srcOrd="3" destOrd="0"/>
+      </dgm:cxnLst>
+      <dgm:bg/>
+      <dgm:whole/>
+    </dgm:dataModel>
+  </dgm:clrData>
+  <dgm:layoutNode name="linear">
+    <dgm:varLst>
+      <dgm:animLvl val="lvl"/>
+      <dgm:resizeHandles val="exact"/>
+    </dgm:varLst>
+    <dgm:alg type="lin">
+      <dgm:param type="linDir" val="fromT"/>
+      <dgm:param type="vertAlign" val="mid"/>
+    </dgm:alg>
+    <dgm:shape xmlns:r="http://schemas.openxmlformats.org/officeDocument/2006/relationships" r:blip="">
+      <dgm:adjLst/>
+    </dgm:shape>
+    <dgm:presOf/>
+    <dgm:constrLst>
+      <dgm:constr type="w" for="ch" forName="parentText" refType="w"/>
+      <dgm:constr type="h" for="ch" forName="parentText" refType="primFontSz" refFor="ch" refForName="parentText" fact="0.52"/>
+      <dgm:constr type="w" for="ch" forName="childText" refType="w"/>
+      <dgm:constr type="h" for="ch" forName="childText" refType="primFontSz" refFor="ch" refForName="parentText" fact="0.46"/>
+      <dgm:constr type="h" for="ch" forName="parentText" op="equ"/>
+      <dgm:constr type="primFontSz" for="ch" forName="parentText" op="equ" val="65"/>
+      <dgm:constr type="primFontSz" for="ch" forName="childText" refType="primFontSz" refFor="ch" refForName="parentText" op="equ"/>
+      <dgm:constr type="h" for="ch" forName="spacer" refType="primFontSz" refFor="ch" refForName="parentText" fact="0.08"/>
+    </dgm:constrLst>
+    <dgm:ruleLst>
+      <dgm:rule type="primFontSz" for="ch" forName="parentText" val="5" fact="NaN" max="NaN"/>
+    </dgm:ruleLst>
+    <dgm:forEach name="Name0" axis="ch" ptType="node">
+      <dgm:layoutNode name="parentText" styleLbl="node1">
+        <dgm:varLst>
+          <dgm:chMax val="0"/>
+          <dgm:bulletEnabled val="1"/>
+        </dgm:varLst>
+        <dgm:alg type="tx">
+          <dgm:param type="parTxLTRAlign" val="l"/>
+          <dgm:param type="parTxRTLAlign" val="r"/>
+        </dgm:alg>
+        <dgm:shape xmlns:r="http://schemas.openxmlformats.org/officeDocument/2006/relationships" type="roundRect" r:blip="">
+          <dgm:adjLst/>
+        </dgm:shape>
+        <dgm:presOf axis="self"/>
+        <dgm:constrLst>
+          <dgm:constr type="tMarg" refType="primFontSz" fact="0.3"/>
+          <dgm:constr type="bMarg" refType="primFontSz" fact="0.3"/>
+          <dgm:constr type="lMarg" refType="primFontSz" fact="0.3"/>
+          <dgm:constr type="rMarg" refType="primFontSz" fact="0.3"/>
+        </dgm:constrLst>
+        <dgm:ruleLst>
+          <dgm:rule type="h" val="INF" fact="NaN" max="NaN"/>
+        </dgm:ruleLst>
+      </dgm:layoutNode>
+      <dgm:choose name="Name1">
+        <dgm:if name="Name2" axis="ch" ptType="node" func="cnt" op="gte" val="1">
+          <dgm:layoutNode name="childText" styleLbl="revTx">
+            <dgm:varLst>
+              <dgm:bulletEnabled val="1"/>
+            </dgm:varLst>
+            <dgm:alg type="tx">
+              <dgm:param type="stBulletLvl" val="1"/>
+              <dgm:param type="lnSpAfChP" val="20"/>
+            </dgm:alg>
+            <dgm:shape xmlns:r="http://schemas.openxmlformats.org/officeDocument/2006/relationships" type="rect" r:blip="">
+              <dgm:adjLst/>
+            </dgm:shape>
+            <dgm:presOf axis="des" ptType="node"/>
+            <dgm:constrLst>
+              <dgm:constr type="tMarg" refType="primFontSz" fact="0.1"/>
+              <dgm:constr type="bMarg" refType="primFontSz" fact="0.1"/>
+              <dgm:constr type="lMarg" refType="w" fact="0.09"/>
+            </dgm:constrLst>
+            <dgm:ruleLst>
+              <dgm:rule type="h" val="INF" fact="NaN" max="NaN"/>
+            </dgm:ruleLst>
+          </dgm:layoutNode>
+        </dgm:if>
+        <dgm:else name="Name3">
+          <dgm:choose name="Name4">
+            <dgm:if name="Name5" axis="par ch" ptType="doc node" func="cnt" op="gte" val="2">
+              <dgm:forEach name="Name6" axis="followSib" ptType="sibTrans" cnt="1">
+                <dgm:layoutNode name="spacer">
+                  <dgm:alg type="sp"/>
+                  <dgm:shape xmlns:r="http://schemas.openxmlformats.org/officeDocument/2006/relationships" r:blip="">
+                    <dgm:adjLst/>
+                  </dgm:shape>
+                  <dgm:presOf/>
+                  <dgm:constrLst/>
+                  <dgm:ruleLst/>
+                </dgm:layoutNode>
+              </dgm:forEach>
+            </dgm:if>
+            <dgm:else name="Name7"/>
+          </dgm:choose>
+        </dgm:else>
+      </dgm:choose>
+    </dgm:forEach>
+  </dgm:layoutNode>
+</dgm:layoutDef>
+</file>
+
+<file path=ppt/diagrams/layout13.xml><?xml version="1.0" encoding="utf-8"?>
 <dgm:layoutDef xmlns:dgm="http://schemas.openxmlformats.org/drawingml/2006/diagram" xmlns:a="http://schemas.openxmlformats.org/drawingml/2006/main" uniqueId="urn:microsoft.com/office/officeart/2005/8/layout/list1">
   <dgm:title val=""/>
   <dgm:desc val=""/>
@@ -19679,7 +21119,7 @@
 </dgm:layoutDef>
 </file>
 
-<file path=ppt/diagrams/layout13.xml><?xml version="1.0" encoding="utf-8"?>
+<file path=ppt/diagrams/layout14.xml><?xml version="1.0" encoding="utf-8"?>
 <dgm:layoutDef xmlns:dgm="http://schemas.openxmlformats.org/drawingml/2006/diagram" xmlns:a="http://schemas.openxmlformats.org/drawingml/2006/main" uniqueId="urn:microsoft.com/office/officeart/2005/8/layout/vList2">
   <dgm:title val=""/>
   <dgm:desc val=""/>
@@ -19846,7 +21286,7 @@
 </dgm:layoutDef>
 </file>
 
-<file path=ppt/diagrams/layout14.xml><?xml version="1.0" encoding="utf-8"?>
+<file path=ppt/diagrams/layout15.xml><?xml version="1.0" encoding="utf-8"?>
 <dgm:layoutDef xmlns:dgm="http://schemas.openxmlformats.org/drawingml/2006/diagram" xmlns:a="http://schemas.openxmlformats.org/drawingml/2006/main" uniqueId="urn:microsoft.com/office/officeart/2005/8/layout/vList2">
   <dgm:title val=""/>
   <dgm:desc val=""/>
@@ -27545,6 +28985,1040 @@
 </dgm:styleDef>
 </file>
 
+<file path=ppt/diagrams/quickStyle15.xml><?xml version="1.0" encoding="utf-8"?>
+<dgm:styleDef xmlns:dgm="http://schemas.openxmlformats.org/drawingml/2006/diagram" xmlns:a="http://schemas.openxmlformats.org/drawingml/2006/main" uniqueId="urn:microsoft.com/office/officeart/2005/8/quickstyle/simple1">
+  <dgm:title val=""/>
+  <dgm:desc val=""/>
+  <dgm:catLst>
+    <dgm:cat type="simple" pri="10100"/>
+  </dgm:catLst>
+  <dgm:scene3d>
+    <a:camera prst="orthographicFront"/>
+    <a:lightRig rig="threePt" dir="t"/>
+  </dgm:scene3d>
+  <dgm:styleLbl name="node0">
+    <dgm:scene3d>
+      <a:camera prst="orthographicFront"/>
+      <a:lightRig rig="threePt" dir="t"/>
+    </dgm:scene3d>
+    <dgm:sp3d/>
+    <dgm:txPr/>
+    <dgm:style>
+      <a:lnRef idx="2">
+        <a:scrgbClr r="0" g="0" b="0"/>
+      </a:lnRef>
+      <a:fillRef idx="1">
+        <a:scrgbClr r="0" g="0" b="0"/>
+      </a:fillRef>
+      <a:effectRef idx="0">
+        <a:scrgbClr r="0" g="0" b="0"/>
+      </a:effectRef>
+      <a:fontRef idx="minor">
+        <a:schemeClr val="lt1"/>
+      </a:fontRef>
+    </dgm:style>
+  </dgm:styleLbl>
+  <dgm:styleLbl name="lnNode1">
+    <dgm:scene3d>
+      <a:camera prst="orthographicFront"/>
+      <a:lightRig rig="threePt" dir="t"/>
+    </dgm:scene3d>
+    <dgm:sp3d/>
+    <dgm:txPr/>
+    <dgm:style>
+      <a:lnRef idx="2">
+        <a:scrgbClr r="0" g="0" b="0"/>
+      </a:lnRef>
+      <a:fillRef idx="1">
+        <a:scrgbClr r="0" g="0" b="0"/>
+      </a:fillRef>
+      <a:effectRef idx="0">
+        <a:scrgbClr r="0" g="0" b="0"/>
+      </a:effectRef>
+      <a:fontRef idx="minor">
+        <a:schemeClr val="lt1"/>
+      </a:fontRef>
+    </dgm:style>
+  </dgm:styleLbl>
+  <dgm:styleLbl name="vennNode1">
+    <dgm:scene3d>
+      <a:camera prst="orthographicFront"/>
+      <a:lightRig rig="threePt" dir="t"/>
+    </dgm:scene3d>
+    <dgm:sp3d/>
+    <dgm:txPr/>
+    <dgm:style>
+      <a:lnRef idx="2">
+        <a:scrgbClr r="0" g="0" b="0"/>
+      </a:lnRef>
+      <a:fillRef idx="1">
+        <a:scrgbClr r="0" g="0" b="0"/>
+      </a:fillRef>
+      <a:effectRef idx="0">
+        <a:scrgbClr r="0" g="0" b="0"/>
+      </a:effectRef>
+      <a:fontRef idx="minor">
+        <a:schemeClr val="tx1"/>
+      </a:fontRef>
+    </dgm:style>
+  </dgm:styleLbl>
+  <dgm:styleLbl name="alignNode1">
+    <dgm:scene3d>
+      <a:camera prst="orthographicFront"/>
+      <a:lightRig rig="threePt" dir="t"/>
+    </dgm:scene3d>
+    <dgm:sp3d/>
+    <dgm:txPr/>
+    <dgm:style>
+      <a:lnRef idx="2">
+        <a:scrgbClr r="0" g="0" b="0"/>
+      </a:lnRef>
+      <a:fillRef idx="1">
+        <a:scrgbClr r="0" g="0" b="0"/>
+      </a:fillRef>
+      <a:effectRef idx="0">
+        <a:scrgbClr r="0" g="0" b="0"/>
+      </a:effectRef>
+      <a:fontRef idx="minor">
+        <a:schemeClr val="lt1"/>
+      </a:fontRef>
+    </dgm:style>
+  </dgm:styleLbl>
+  <dgm:styleLbl name="node1">
+    <dgm:scene3d>
+      <a:camera prst="orthographicFront"/>
+      <a:lightRig rig="threePt" dir="t"/>
+    </dgm:scene3d>
+    <dgm:sp3d/>
+    <dgm:txPr/>
+    <dgm:style>
+      <a:lnRef idx="2">
+        <a:scrgbClr r="0" g="0" b="0"/>
+      </a:lnRef>
+      <a:fillRef idx="1">
+        <a:scrgbClr r="0" g="0" b="0"/>
+      </a:fillRef>
+      <a:effectRef idx="0">
+        <a:scrgbClr r="0" g="0" b="0"/>
+      </a:effectRef>
+      <a:fontRef idx="minor">
+        <a:schemeClr val="lt1"/>
+      </a:fontRef>
+    </dgm:style>
+  </dgm:styleLbl>
+  <dgm:styleLbl name="node2">
+    <dgm:scene3d>
+      <a:camera prst="orthographicFront"/>
+      <a:lightRig rig="threePt" dir="t"/>
+    </dgm:scene3d>
+    <dgm:sp3d/>
+    <dgm:txPr/>
+    <dgm:style>
+      <a:lnRef idx="2">
+        <a:scrgbClr r="0" g="0" b="0"/>
+      </a:lnRef>
+      <a:fillRef idx="1">
+        <a:scrgbClr r="0" g="0" b="0"/>
+      </a:fillRef>
+      <a:effectRef idx="0">
+        <a:scrgbClr r="0" g="0" b="0"/>
+      </a:effectRef>
+      <a:fontRef idx="minor">
+        <a:schemeClr val="lt1"/>
+      </a:fontRef>
+    </dgm:style>
+  </dgm:styleLbl>
+  <dgm:styleLbl name="node3">
+    <dgm:scene3d>
+      <a:camera prst="orthographicFront"/>
+      <a:lightRig rig="threePt" dir="t"/>
+    </dgm:scene3d>
+    <dgm:sp3d/>
+    <dgm:txPr/>
+    <dgm:style>
+      <a:lnRef idx="2">
+        <a:scrgbClr r="0" g="0" b="0"/>
+      </a:lnRef>
+      <a:fillRef idx="1">
+        <a:scrgbClr r="0" g="0" b="0"/>
+      </a:fillRef>
+      <a:effectRef idx="0">
+        <a:scrgbClr r="0" g="0" b="0"/>
+      </a:effectRef>
+      <a:fontRef idx="minor">
+        <a:schemeClr val="lt1"/>
+      </a:fontRef>
+    </dgm:style>
+  </dgm:styleLbl>
+  <dgm:styleLbl name="node4">
+    <dgm:scene3d>
+      <a:camera prst="orthographicFront"/>
+      <a:lightRig rig="threePt" dir="t"/>
+    </dgm:scene3d>
+    <dgm:sp3d/>
+    <dgm:txPr/>
+    <dgm:style>
+      <a:lnRef idx="2">
+        <a:scrgbClr r="0" g="0" b="0"/>
+      </a:lnRef>
+      <a:fillRef idx="1">
+        <a:scrgbClr r="0" g="0" b="0"/>
+      </a:fillRef>
+      <a:effectRef idx="0">
+        <a:scrgbClr r="0" g="0" b="0"/>
+      </a:effectRef>
+      <a:fontRef idx="minor">
+        <a:schemeClr val="lt1"/>
+      </a:fontRef>
+    </dgm:style>
+  </dgm:styleLbl>
+  <dgm:styleLbl name="fgImgPlace1">
+    <dgm:scene3d>
+      <a:camera prst="orthographicFront"/>
+      <a:lightRig rig="threePt" dir="t"/>
+    </dgm:scene3d>
+    <dgm:sp3d/>
+    <dgm:txPr/>
+    <dgm:style>
+      <a:lnRef idx="2">
+        <a:scrgbClr r="0" g="0" b="0"/>
+      </a:lnRef>
+      <a:fillRef idx="1">
+        <a:scrgbClr r="0" g="0" b="0"/>
+      </a:fillRef>
+      <a:effectRef idx="0">
+        <a:scrgbClr r="0" g="0" b="0"/>
+      </a:effectRef>
+      <a:fontRef idx="minor"/>
+    </dgm:style>
+  </dgm:styleLbl>
+  <dgm:styleLbl name="alignImgPlace1">
+    <dgm:scene3d>
+      <a:camera prst="orthographicFront"/>
+      <a:lightRig rig="threePt" dir="t"/>
+    </dgm:scene3d>
+    <dgm:sp3d/>
+    <dgm:txPr/>
+    <dgm:style>
+      <a:lnRef idx="2">
+        <a:scrgbClr r="0" g="0" b="0"/>
+      </a:lnRef>
+      <a:fillRef idx="1">
+        <a:scrgbClr r="0" g="0" b="0"/>
+      </a:fillRef>
+      <a:effectRef idx="0">
+        <a:scrgbClr r="0" g="0" b="0"/>
+      </a:effectRef>
+      <a:fontRef idx="minor"/>
+    </dgm:style>
+  </dgm:styleLbl>
+  <dgm:styleLbl name="bgImgPlace1">
+    <dgm:scene3d>
+      <a:camera prst="orthographicFront"/>
+      <a:lightRig rig="threePt" dir="t"/>
+    </dgm:scene3d>
+    <dgm:sp3d/>
+    <dgm:txPr/>
+    <dgm:style>
+      <a:lnRef idx="2">
+        <a:scrgbClr r="0" g="0" b="0"/>
+      </a:lnRef>
+      <a:fillRef idx="1">
+        <a:scrgbClr r="0" g="0" b="0"/>
+      </a:fillRef>
+      <a:effectRef idx="0">
+        <a:scrgbClr r="0" g="0" b="0"/>
+      </a:effectRef>
+      <a:fontRef idx="minor"/>
+    </dgm:style>
+  </dgm:styleLbl>
+  <dgm:styleLbl name="sibTrans2D1">
+    <dgm:scene3d>
+      <a:camera prst="orthographicFront"/>
+      <a:lightRig rig="threePt" dir="t"/>
+    </dgm:scene3d>
+    <dgm:sp3d/>
+    <dgm:txPr/>
+    <dgm:style>
+      <a:lnRef idx="0">
+        <a:scrgbClr r="0" g="0" b="0"/>
+      </a:lnRef>
+      <a:fillRef idx="1">
+        <a:scrgbClr r="0" g="0" b="0"/>
+      </a:fillRef>
+      <a:effectRef idx="0">
+        <a:scrgbClr r="0" g="0" b="0"/>
+      </a:effectRef>
+      <a:fontRef idx="minor">
+        <a:schemeClr val="lt1"/>
+      </a:fontRef>
+    </dgm:style>
+  </dgm:styleLbl>
+  <dgm:styleLbl name="fgSibTrans2D1">
+    <dgm:scene3d>
+      <a:camera prst="orthographicFront"/>
+      <a:lightRig rig="threePt" dir="t"/>
+    </dgm:scene3d>
+    <dgm:sp3d/>
+    <dgm:txPr/>
+    <dgm:style>
+      <a:lnRef idx="0">
+        <a:scrgbClr r="0" g="0" b="0"/>
+      </a:lnRef>
+      <a:fillRef idx="1">
+        <a:scrgbClr r="0" g="0" b="0"/>
+      </a:fillRef>
+      <a:effectRef idx="0">
+        <a:scrgbClr r="0" g="0" b="0"/>
+      </a:effectRef>
+      <a:fontRef idx="minor">
+        <a:schemeClr val="lt1"/>
+      </a:fontRef>
+    </dgm:style>
+  </dgm:styleLbl>
+  <dgm:styleLbl name="bgSibTrans2D1">
+    <dgm:scene3d>
+      <a:camera prst="orthographicFront"/>
+      <a:lightRig rig="threePt" dir="t"/>
+    </dgm:scene3d>
+    <dgm:sp3d/>
+    <dgm:txPr/>
+    <dgm:style>
+      <a:lnRef idx="0">
+        <a:scrgbClr r="0" g="0" b="0"/>
+      </a:lnRef>
+      <a:fillRef idx="1">
+        <a:scrgbClr r="0" g="0" b="0"/>
+      </a:fillRef>
+      <a:effectRef idx="0">
+        <a:scrgbClr r="0" g="0" b="0"/>
+      </a:effectRef>
+      <a:fontRef idx="minor">
+        <a:schemeClr val="lt1"/>
+      </a:fontRef>
+    </dgm:style>
+  </dgm:styleLbl>
+  <dgm:styleLbl name="sibTrans1D1">
+    <dgm:scene3d>
+      <a:camera prst="orthographicFront"/>
+      <a:lightRig rig="threePt" dir="t"/>
+    </dgm:scene3d>
+    <dgm:sp3d/>
+    <dgm:txPr/>
+    <dgm:style>
+      <a:lnRef idx="1">
+        <a:scrgbClr r="0" g="0" b="0"/>
+      </a:lnRef>
+      <a:fillRef idx="0">
+        <a:scrgbClr r="0" g="0" b="0"/>
+      </a:fillRef>
+      <a:effectRef idx="0">
+        <a:scrgbClr r="0" g="0" b="0"/>
+      </a:effectRef>
+      <a:fontRef idx="minor"/>
+    </dgm:style>
+  </dgm:styleLbl>
+  <dgm:styleLbl name="callout">
+    <dgm:scene3d>
+      <a:camera prst="orthographicFront"/>
+      <a:lightRig rig="threePt" dir="t"/>
+    </dgm:scene3d>
+    <dgm:sp3d/>
+    <dgm:txPr/>
+    <dgm:style>
+      <a:lnRef idx="2">
+        <a:scrgbClr r="0" g="0" b="0"/>
+      </a:lnRef>
+      <a:fillRef idx="1">
+        <a:scrgbClr r="0" g="0" b="0"/>
+      </a:fillRef>
+      <a:effectRef idx="0">
+        <a:scrgbClr r="0" g="0" b="0"/>
+      </a:effectRef>
+      <a:fontRef idx="minor"/>
+    </dgm:style>
+  </dgm:styleLbl>
+  <dgm:styleLbl name="asst0">
+    <dgm:scene3d>
+      <a:camera prst="orthographicFront"/>
+      <a:lightRig rig="threePt" dir="t"/>
+    </dgm:scene3d>
+    <dgm:sp3d/>
+    <dgm:txPr/>
+    <dgm:style>
+      <a:lnRef idx="2">
+        <a:scrgbClr r="0" g="0" b="0"/>
+      </a:lnRef>
+      <a:fillRef idx="1">
+        <a:scrgbClr r="0" g="0" b="0"/>
+      </a:fillRef>
+      <a:effectRef idx="0">
+        <a:scrgbClr r="0" g="0" b="0"/>
+      </a:effectRef>
+      <a:fontRef idx="minor">
+        <a:schemeClr val="lt1"/>
+      </a:fontRef>
+    </dgm:style>
+  </dgm:styleLbl>
+  <dgm:styleLbl name="asst1">
+    <dgm:scene3d>
+      <a:camera prst="orthographicFront"/>
+      <a:lightRig rig="threePt" dir="t"/>
+    </dgm:scene3d>
+    <dgm:sp3d/>
+    <dgm:txPr/>
+    <dgm:style>
+      <a:lnRef idx="2">
+        <a:scrgbClr r="0" g="0" b="0"/>
+      </a:lnRef>
+      <a:fillRef idx="1">
+        <a:scrgbClr r="0" g="0" b="0"/>
+      </a:fillRef>
+      <a:effectRef idx="0">
+        <a:scrgbClr r="0" g="0" b="0"/>
+      </a:effectRef>
+      <a:fontRef idx="minor">
+        <a:schemeClr val="lt1"/>
+      </a:fontRef>
+    </dgm:style>
+  </dgm:styleLbl>
+  <dgm:styleLbl name="asst2">
+    <dgm:scene3d>
+      <a:camera prst="orthographicFront"/>
+      <a:lightRig rig="threePt" dir="t"/>
+    </dgm:scene3d>
+    <dgm:sp3d/>
+    <dgm:txPr/>
+    <dgm:style>
+      <a:lnRef idx="2">
+        <a:scrgbClr r="0" g="0" b="0"/>
+      </a:lnRef>
+      <a:fillRef idx="1">
+        <a:scrgbClr r="0" g="0" b="0"/>
+      </a:fillRef>
+      <a:effectRef idx="0">
+        <a:scrgbClr r="0" g="0" b="0"/>
+      </a:effectRef>
+      <a:fontRef idx="minor">
+        <a:schemeClr val="lt1"/>
+      </a:fontRef>
+    </dgm:style>
+  </dgm:styleLbl>
+  <dgm:styleLbl name="asst3">
+    <dgm:scene3d>
+      <a:camera prst="orthographicFront"/>
+      <a:lightRig rig="threePt" dir="t"/>
+    </dgm:scene3d>
+    <dgm:sp3d/>
+    <dgm:txPr/>
+    <dgm:style>
+      <a:lnRef idx="2">
+        <a:scrgbClr r="0" g="0" b="0"/>
+      </a:lnRef>
+      <a:fillRef idx="1">
+        <a:scrgbClr r="0" g="0" b="0"/>
+      </a:fillRef>
+      <a:effectRef idx="0">
+        <a:scrgbClr r="0" g="0" b="0"/>
+      </a:effectRef>
+      <a:fontRef idx="minor">
+        <a:schemeClr val="lt1"/>
+      </a:fontRef>
+    </dgm:style>
+  </dgm:styleLbl>
+  <dgm:styleLbl name="asst4">
+    <dgm:scene3d>
+      <a:camera prst="orthographicFront"/>
+      <a:lightRig rig="threePt" dir="t"/>
+    </dgm:scene3d>
+    <dgm:sp3d/>
+    <dgm:txPr/>
+    <dgm:style>
+      <a:lnRef idx="2">
+        <a:scrgbClr r="0" g="0" b="0"/>
+      </a:lnRef>
+      <a:fillRef idx="1">
+        <a:scrgbClr r="0" g="0" b="0"/>
+      </a:fillRef>
+      <a:effectRef idx="0">
+        <a:scrgbClr r="0" g="0" b="0"/>
+      </a:effectRef>
+      <a:fontRef idx="minor">
+        <a:schemeClr val="lt1"/>
+      </a:fontRef>
+    </dgm:style>
+  </dgm:styleLbl>
+  <dgm:styleLbl name="parChTrans2D1">
+    <dgm:scene3d>
+      <a:camera prst="orthographicFront"/>
+      <a:lightRig rig="threePt" dir="t"/>
+    </dgm:scene3d>
+    <dgm:sp3d/>
+    <dgm:txPr/>
+    <dgm:style>
+      <a:lnRef idx="2">
+        <a:scrgbClr r="0" g="0" b="0"/>
+      </a:lnRef>
+      <a:fillRef idx="1">
+        <a:scrgbClr r="0" g="0" b="0"/>
+      </a:fillRef>
+      <a:effectRef idx="0">
+        <a:scrgbClr r="0" g="0" b="0"/>
+      </a:effectRef>
+      <a:fontRef idx="minor">
+        <a:schemeClr val="lt1"/>
+      </a:fontRef>
+    </dgm:style>
+  </dgm:styleLbl>
+  <dgm:styleLbl name="parChTrans2D2">
+    <dgm:scene3d>
+      <a:camera prst="orthographicFront"/>
+      <a:lightRig rig="threePt" dir="t"/>
+    </dgm:scene3d>
+    <dgm:sp3d/>
+    <dgm:txPr/>
+    <dgm:style>
+      <a:lnRef idx="2">
+        <a:scrgbClr r="0" g="0" b="0"/>
+      </a:lnRef>
+      <a:fillRef idx="1">
+        <a:scrgbClr r="0" g="0" b="0"/>
+      </a:fillRef>
+      <a:effectRef idx="0">
+        <a:scrgbClr r="0" g="0" b="0"/>
+      </a:effectRef>
+      <a:fontRef idx="minor">
+        <a:schemeClr val="lt1"/>
+      </a:fontRef>
+    </dgm:style>
+  </dgm:styleLbl>
+  <dgm:styleLbl name="parChTrans2D3">
+    <dgm:scene3d>
+      <a:camera prst="orthographicFront"/>
+      <a:lightRig rig="threePt" dir="t"/>
+    </dgm:scene3d>
+    <dgm:sp3d/>
+    <dgm:txPr/>
+    <dgm:style>
+      <a:lnRef idx="2">
+        <a:scrgbClr r="0" g="0" b="0"/>
+      </a:lnRef>
+      <a:fillRef idx="1">
+        <a:scrgbClr r="0" g="0" b="0"/>
+      </a:fillRef>
+      <a:effectRef idx="0">
+        <a:scrgbClr r="0" g="0" b="0"/>
+      </a:effectRef>
+      <a:fontRef idx="minor">
+        <a:schemeClr val="lt1"/>
+      </a:fontRef>
+    </dgm:style>
+  </dgm:styleLbl>
+  <dgm:styleLbl name="parChTrans2D4">
+    <dgm:scene3d>
+      <a:camera prst="orthographicFront"/>
+      <a:lightRig rig="threePt" dir="t"/>
+    </dgm:scene3d>
+    <dgm:sp3d/>
+    <dgm:txPr/>
+    <dgm:style>
+      <a:lnRef idx="2">
+        <a:scrgbClr r="0" g="0" b="0"/>
+      </a:lnRef>
+      <a:fillRef idx="1">
+        <a:scrgbClr r="0" g="0" b="0"/>
+      </a:fillRef>
+      <a:effectRef idx="0">
+        <a:scrgbClr r="0" g="0" b="0"/>
+      </a:effectRef>
+      <a:fontRef idx="minor">
+        <a:schemeClr val="lt1"/>
+      </a:fontRef>
+    </dgm:style>
+  </dgm:styleLbl>
+  <dgm:styleLbl name="parChTrans1D1">
+    <dgm:scene3d>
+      <a:camera prst="orthographicFront"/>
+      <a:lightRig rig="threePt" dir="t"/>
+    </dgm:scene3d>
+    <dgm:sp3d/>
+    <dgm:txPr/>
+    <dgm:style>
+      <a:lnRef idx="2">
+        <a:scrgbClr r="0" g="0" b="0"/>
+      </a:lnRef>
+      <a:fillRef idx="0">
+        <a:scrgbClr r="0" g="0" b="0"/>
+      </a:fillRef>
+      <a:effectRef idx="0">
+        <a:scrgbClr r="0" g="0" b="0"/>
+      </a:effectRef>
+      <a:fontRef idx="minor"/>
+    </dgm:style>
+  </dgm:styleLbl>
+  <dgm:styleLbl name="parChTrans1D2">
+    <dgm:scene3d>
+      <a:camera prst="orthographicFront"/>
+      <a:lightRig rig="threePt" dir="t"/>
+    </dgm:scene3d>
+    <dgm:sp3d/>
+    <dgm:txPr/>
+    <dgm:style>
+      <a:lnRef idx="2">
+        <a:scrgbClr r="0" g="0" b="0"/>
+      </a:lnRef>
+      <a:fillRef idx="0">
+        <a:scrgbClr r="0" g="0" b="0"/>
+      </a:fillRef>
+      <a:effectRef idx="0">
+        <a:scrgbClr r="0" g="0" b="0"/>
+      </a:effectRef>
+      <a:fontRef idx="minor"/>
+    </dgm:style>
+  </dgm:styleLbl>
+  <dgm:styleLbl name="parChTrans1D3">
+    <dgm:scene3d>
+      <a:camera prst="orthographicFront"/>
+      <a:lightRig rig="threePt" dir="t"/>
+    </dgm:scene3d>
+    <dgm:sp3d/>
+    <dgm:txPr/>
+    <dgm:style>
+      <a:lnRef idx="2">
+        <a:scrgbClr r="0" g="0" b="0"/>
+      </a:lnRef>
+      <a:fillRef idx="0">
+        <a:scrgbClr r="0" g="0" b="0"/>
+      </a:fillRef>
+      <a:effectRef idx="0">
+        <a:scrgbClr r="0" g="0" b="0"/>
+      </a:effectRef>
+      <a:fontRef idx="minor"/>
+    </dgm:style>
+  </dgm:styleLbl>
+  <dgm:styleLbl name="parChTrans1D4">
+    <dgm:scene3d>
+      <a:camera prst="orthographicFront"/>
+      <a:lightRig rig="threePt" dir="t"/>
+    </dgm:scene3d>
+    <dgm:sp3d/>
+    <dgm:txPr/>
+    <dgm:style>
+      <a:lnRef idx="2">
+        <a:scrgbClr r="0" g="0" b="0"/>
+      </a:lnRef>
+      <a:fillRef idx="0">
+        <a:scrgbClr r="0" g="0" b="0"/>
+      </a:fillRef>
+      <a:effectRef idx="0">
+        <a:scrgbClr r="0" g="0" b="0"/>
+      </a:effectRef>
+      <a:fontRef idx="minor"/>
+    </dgm:style>
+  </dgm:styleLbl>
+  <dgm:styleLbl name="fgAcc1">
+    <dgm:scene3d>
+      <a:camera prst="orthographicFront"/>
+      <a:lightRig rig="threePt" dir="t"/>
+    </dgm:scene3d>
+    <dgm:sp3d/>
+    <dgm:txPr/>
+    <dgm:style>
+      <a:lnRef idx="2">
+        <a:scrgbClr r="0" g="0" b="0"/>
+      </a:lnRef>
+      <a:fillRef idx="1">
+        <a:scrgbClr r="0" g="0" b="0"/>
+      </a:fillRef>
+      <a:effectRef idx="0">
+        <a:scrgbClr r="0" g="0" b="0"/>
+      </a:effectRef>
+      <a:fontRef idx="minor"/>
+    </dgm:style>
+  </dgm:styleLbl>
+  <dgm:styleLbl name="conFgAcc1">
+    <dgm:scene3d>
+      <a:camera prst="orthographicFront"/>
+      <a:lightRig rig="threePt" dir="t"/>
+    </dgm:scene3d>
+    <dgm:sp3d/>
+    <dgm:txPr/>
+    <dgm:style>
+      <a:lnRef idx="2">
+        <a:scrgbClr r="0" g="0" b="0"/>
+      </a:lnRef>
+      <a:fillRef idx="1">
+        <a:scrgbClr r="0" g="0" b="0"/>
+      </a:fillRef>
+      <a:effectRef idx="0">
+        <a:scrgbClr r="0" g="0" b="0"/>
+      </a:effectRef>
+      <a:fontRef idx="minor"/>
+    </dgm:style>
+  </dgm:styleLbl>
+  <dgm:styleLbl name="alignAcc1">
+    <dgm:scene3d>
+      <a:camera prst="orthographicFront"/>
+      <a:lightRig rig="threePt" dir="t"/>
+    </dgm:scene3d>
+    <dgm:sp3d/>
+    <dgm:txPr/>
+    <dgm:style>
+      <a:lnRef idx="2">
+        <a:scrgbClr r="0" g="0" b="0"/>
+      </a:lnRef>
+      <a:fillRef idx="1">
+        <a:scrgbClr r="0" g="0" b="0"/>
+      </a:fillRef>
+      <a:effectRef idx="0">
+        <a:scrgbClr r="0" g="0" b="0"/>
+      </a:effectRef>
+      <a:fontRef idx="minor"/>
+    </dgm:style>
+  </dgm:styleLbl>
+  <dgm:styleLbl name="trAlignAcc1">
+    <dgm:scene3d>
+      <a:camera prst="orthographicFront"/>
+      <a:lightRig rig="threePt" dir="t"/>
+    </dgm:scene3d>
+    <dgm:sp3d/>
+    <dgm:txPr/>
+    <dgm:style>
+      <a:lnRef idx="1">
+        <a:scrgbClr r="0" g="0" b="0"/>
+      </a:lnRef>
+      <a:fillRef idx="1">
+        <a:scrgbClr r="0" g="0" b="0"/>
+      </a:fillRef>
+      <a:effectRef idx="0">
+        <a:scrgbClr r="0" g="0" b="0"/>
+      </a:effectRef>
+      <a:fontRef idx="minor"/>
+    </dgm:style>
+  </dgm:styleLbl>
+  <dgm:styleLbl name="bgAcc1">
+    <dgm:scene3d>
+      <a:camera prst="orthographicFront"/>
+      <a:lightRig rig="threePt" dir="t"/>
+    </dgm:scene3d>
+    <dgm:sp3d/>
+    <dgm:txPr/>
+    <dgm:style>
+      <a:lnRef idx="2">
+        <a:scrgbClr r="0" g="0" b="0"/>
+      </a:lnRef>
+      <a:fillRef idx="1">
+        <a:scrgbClr r="0" g="0" b="0"/>
+      </a:fillRef>
+      <a:effectRef idx="0">
+        <a:scrgbClr r="0" g="0" b="0"/>
+      </a:effectRef>
+      <a:fontRef idx="minor"/>
+    </dgm:style>
+  </dgm:styleLbl>
+  <dgm:styleLbl name="solidFgAcc1">
+    <dgm:scene3d>
+      <a:camera prst="orthographicFront"/>
+      <a:lightRig rig="threePt" dir="t"/>
+    </dgm:scene3d>
+    <dgm:sp3d/>
+    <dgm:txPr/>
+    <dgm:style>
+      <a:lnRef idx="2">
+        <a:scrgbClr r="0" g="0" b="0"/>
+      </a:lnRef>
+      <a:fillRef idx="1">
+        <a:scrgbClr r="0" g="0" b="0"/>
+      </a:fillRef>
+      <a:effectRef idx="0">
+        <a:scrgbClr r="0" g="0" b="0"/>
+      </a:effectRef>
+      <a:fontRef idx="minor"/>
+    </dgm:style>
+  </dgm:styleLbl>
+  <dgm:styleLbl name="solidAlignAcc1">
+    <dgm:scene3d>
+      <a:camera prst="orthographicFront"/>
+      <a:lightRig rig="threePt" dir="t"/>
+    </dgm:scene3d>
+    <dgm:sp3d/>
+    <dgm:txPr/>
+    <dgm:style>
+      <a:lnRef idx="2">
+        <a:scrgbClr r="0" g="0" b="0"/>
+      </a:lnRef>
+      <a:fillRef idx="1">
+        <a:scrgbClr r="0" g="0" b="0"/>
+      </a:fillRef>
+      <a:effectRef idx="0">
+        <a:scrgbClr r="0" g="0" b="0"/>
+      </a:effectRef>
+      <a:fontRef idx="minor"/>
+    </dgm:style>
+  </dgm:styleLbl>
+  <dgm:styleLbl name="solidBgAcc1">
+    <dgm:scene3d>
+      <a:camera prst="orthographicFront"/>
+      <a:lightRig rig="threePt" dir="t"/>
+    </dgm:scene3d>
+    <dgm:sp3d/>
+    <dgm:txPr/>
+    <dgm:style>
+      <a:lnRef idx="2">
+        <a:scrgbClr r="0" g="0" b="0"/>
+      </a:lnRef>
+      <a:fillRef idx="1">
+        <a:scrgbClr r="0" g="0" b="0"/>
+      </a:fillRef>
+      <a:effectRef idx="0">
+        <a:scrgbClr r="0" g="0" b="0"/>
+      </a:effectRef>
+      <a:fontRef idx="minor"/>
+    </dgm:style>
+  </dgm:styleLbl>
+  <dgm:styleLbl name="fgAccFollowNode1">
+    <dgm:scene3d>
+      <a:camera prst="orthographicFront"/>
+      <a:lightRig rig="threePt" dir="t"/>
+    </dgm:scene3d>
+    <dgm:sp3d/>
+    <dgm:txPr/>
+    <dgm:style>
+      <a:lnRef idx="2">
+        <a:scrgbClr r="0" g="0" b="0"/>
+      </a:lnRef>
+      <a:fillRef idx="1">
+        <a:scrgbClr r="0" g="0" b="0"/>
+      </a:fillRef>
+      <a:effectRef idx="0">
+        <a:scrgbClr r="0" g="0" b="0"/>
+      </a:effectRef>
+      <a:fontRef idx="minor"/>
+    </dgm:style>
+  </dgm:styleLbl>
+  <dgm:styleLbl name="alignAccFollowNode1">
+    <dgm:scene3d>
+      <a:camera prst="orthographicFront"/>
+      <a:lightRig rig="threePt" dir="t"/>
+    </dgm:scene3d>
+    <dgm:sp3d/>
+    <dgm:txPr/>
+    <dgm:style>
+      <a:lnRef idx="2">
+        <a:scrgbClr r="0" g="0" b="0"/>
+      </a:lnRef>
+      <a:fillRef idx="1">
+        <a:scrgbClr r="0" g="0" b="0"/>
+      </a:fillRef>
+      <a:effectRef idx="0">
+        <a:scrgbClr r="0" g="0" b="0"/>
+      </a:effectRef>
+      <a:fontRef idx="minor"/>
+    </dgm:style>
+  </dgm:styleLbl>
+  <dgm:styleLbl name="bgAccFollowNode1">
+    <dgm:scene3d>
+      <a:camera prst="orthographicFront"/>
+      <a:lightRig rig="threePt" dir="t"/>
+    </dgm:scene3d>
+    <dgm:sp3d/>
+    <dgm:txPr/>
+    <dgm:style>
+      <a:lnRef idx="2">
+        <a:scrgbClr r="0" g="0" b="0"/>
+      </a:lnRef>
+      <a:fillRef idx="1">
+        <a:scrgbClr r="0" g="0" b="0"/>
+      </a:fillRef>
+      <a:effectRef idx="0">
+        <a:scrgbClr r="0" g="0" b="0"/>
+      </a:effectRef>
+      <a:fontRef idx="minor"/>
+    </dgm:style>
+  </dgm:styleLbl>
+  <dgm:styleLbl name="fgAcc0">
+    <dgm:scene3d>
+      <a:camera prst="orthographicFront"/>
+      <a:lightRig rig="threePt" dir="t"/>
+    </dgm:scene3d>
+    <dgm:sp3d/>
+    <dgm:txPr/>
+    <dgm:style>
+      <a:lnRef idx="2">
+        <a:scrgbClr r="0" g="0" b="0"/>
+      </a:lnRef>
+      <a:fillRef idx="1">
+        <a:scrgbClr r="0" g="0" b="0"/>
+      </a:fillRef>
+      <a:effectRef idx="0">
+        <a:scrgbClr r="0" g="0" b="0"/>
+      </a:effectRef>
+      <a:fontRef idx="minor"/>
+    </dgm:style>
+  </dgm:styleLbl>
+  <dgm:styleLbl name="fgAcc2">
+    <dgm:scene3d>
+      <a:camera prst="orthographicFront"/>
+      <a:lightRig rig="threePt" dir="t"/>
+    </dgm:scene3d>
+    <dgm:sp3d/>
+    <dgm:txPr/>
+    <dgm:style>
+      <a:lnRef idx="2">
+        <a:scrgbClr r="0" g="0" b="0"/>
+      </a:lnRef>
+      <a:fillRef idx="1">
+        <a:scrgbClr r="0" g="0" b="0"/>
+      </a:fillRef>
+      <a:effectRef idx="0">
+        <a:scrgbClr r="0" g="0" b="0"/>
+      </a:effectRef>
+      <a:fontRef idx="minor"/>
+    </dgm:style>
+  </dgm:styleLbl>
+  <dgm:styleLbl name="fgAcc3">
+    <dgm:scene3d>
+      <a:camera prst="orthographicFront"/>
+      <a:lightRig rig="threePt" dir="t"/>
+    </dgm:scene3d>
+    <dgm:sp3d/>
+    <dgm:txPr/>
+    <dgm:style>
+      <a:lnRef idx="2">
+        <a:scrgbClr r="0" g="0" b="0"/>
+      </a:lnRef>
+      <a:fillRef idx="1">
+        <a:scrgbClr r="0" g="0" b="0"/>
+      </a:fillRef>
+      <a:effectRef idx="0">
+        <a:scrgbClr r="0" g="0" b="0"/>
+      </a:effectRef>
+      <a:fontRef idx="minor"/>
+    </dgm:style>
+  </dgm:styleLbl>
+  <dgm:styleLbl name="fgAcc4">
+    <dgm:scene3d>
+      <a:camera prst="orthographicFront"/>
+      <a:lightRig rig="threePt" dir="t"/>
+    </dgm:scene3d>
+    <dgm:sp3d/>
+    <dgm:txPr/>
+    <dgm:style>
+      <a:lnRef idx="2">
+        <a:scrgbClr r="0" g="0" b="0"/>
+      </a:lnRef>
+      <a:fillRef idx="1">
+        <a:scrgbClr r="0" g="0" b="0"/>
+      </a:fillRef>
+      <a:effectRef idx="0">
+        <a:scrgbClr r="0" g="0" b="0"/>
+      </a:effectRef>
+      <a:fontRef idx="minor"/>
+    </dgm:style>
+  </dgm:styleLbl>
+  <dgm:styleLbl name="bgShp">
+    <dgm:scene3d>
+      <a:camera prst="orthographicFront"/>
+      <a:lightRig rig="threePt" dir="t"/>
+    </dgm:scene3d>
+    <dgm:sp3d/>
+    <dgm:txPr/>
+    <dgm:style>
+      <a:lnRef idx="0">
+        <a:scrgbClr r="0" g="0" b="0"/>
+      </a:lnRef>
+      <a:fillRef idx="1">
+        <a:scrgbClr r="0" g="0" b="0"/>
+      </a:fillRef>
+      <a:effectRef idx="0">
+        <a:scrgbClr r="0" g="0" b="0"/>
+      </a:effectRef>
+      <a:fontRef idx="minor"/>
+    </dgm:style>
+  </dgm:styleLbl>
+  <dgm:styleLbl name="dkBgShp">
+    <dgm:scene3d>
+      <a:camera prst="orthographicFront"/>
+      <a:lightRig rig="threePt" dir="t"/>
+    </dgm:scene3d>
+    <dgm:sp3d/>
+    <dgm:txPr/>
+    <dgm:style>
+      <a:lnRef idx="0">
+        <a:scrgbClr r="0" g="0" b="0"/>
+      </a:lnRef>
+      <a:fillRef idx="1">
+        <a:scrgbClr r="0" g="0" b="0"/>
+      </a:fillRef>
+      <a:effectRef idx="0">
+        <a:scrgbClr r="0" g="0" b="0"/>
+      </a:effectRef>
+      <a:fontRef idx="minor"/>
+    </dgm:style>
+  </dgm:styleLbl>
+  <dgm:styleLbl name="trBgShp">
+    <dgm:scene3d>
+      <a:camera prst="orthographicFront"/>
+      <a:lightRig rig="threePt" dir="t"/>
+    </dgm:scene3d>
+    <dgm:sp3d/>
+    <dgm:txPr/>
+    <dgm:style>
+      <a:lnRef idx="0">
+        <a:scrgbClr r="0" g="0" b="0"/>
+      </a:lnRef>
+      <a:fillRef idx="1">
+        <a:scrgbClr r="0" g="0" b="0"/>
+      </a:fillRef>
+      <a:effectRef idx="0">
+        <a:scrgbClr r="0" g="0" b="0"/>
+      </a:effectRef>
+      <a:fontRef idx="minor"/>
+    </dgm:style>
+  </dgm:styleLbl>
+  <dgm:styleLbl name="fgShp">
+    <dgm:scene3d>
+      <a:camera prst="orthographicFront"/>
+      <a:lightRig rig="threePt" dir="t"/>
+    </dgm:scene3d>
+    <dgm:sp3d/>
+    <dgm:txPr/>
+    <dgm:style>
+      <a:lnRef idx="2">
+        <a:scrgbClr r="0" g="0" b="0"/>
+      </a:lnRef>
+      <a:fillRef idx="1">
+        <a:scrgbClr r="0" g="0" b="0"/>
+      </a:fillRef>
+      <a:effectRef idx="0">
+        <a:scrgbClr r="0" g="0" b="0"/>
+      </a:effectRef>
+      <a:fontRef idx="minor"/>
+    </dgm:style>
+  </dgm:styleLbl>
+  <dgm:styleLbl name="revTx">
+    <dgm:scene3d>
+      <a:camera prst="orthographicFront"/>
+      <a:lightRig rig="threePt" dir="t"/>
+    </dgm:scene3d>
+    <dgm:sp3d/>
+    <dgm:txPr/>
+    <dgm:style>
+      <a:lnRef idx="0">
+        <a:scrgbClr r="0" g="0" b="0"/>
+      </a:lnRef>
+      <a:fillRef idx="0">
+        <a:scrgbClr r="0" g="0" b="0"/>
+      </a:fillRef>
+      <a:effectRef idx="0">
+        <a:scrgbClr r="0" g="0" b="0"/>
+      </a:effectRef>
+      <a:fontRef idx="minor"/>
+    </dgm:style>
+  </dgm:styleLbl>
+</dgm:styleDef>
+</file>
+
 <file path=ppt/diagrams/quickStyle2.xml><?xml version="1.0" encoding="utf-8"?>
 <dgm:styleDef xmlns:dgm="http://schemas.openxmlformats.org/drawingml/2006/diagram" xmlns:a="http://schemas.openxmlformats.org/drawingml/2006/main" uniqueId="urn:microsoft.com/office/officeart/2005/8/quickstyle/simple1">
   <dgm:title val=""/>
@@ -35899,7 +38373,7 @@
           <a:p>
             <a:fld id="{B545A12E-A9A4-4075-8B34-6840EFC874D8}" type="datetimeFigureOut">
               <a:rPr lang="zh-CN" altLang="en-US" smtClean="0"/>
-              <a:t>2022/10/23</a:t>
+              <a:t>2022/10/24</a:t>
             </a:fld>
             <a:endParaRPr lang="zh-CN" altLang="en-US"/>
           </a:p>
@@ -36452,6 +38926,383 @@
     <p:extLst>
       <p:ext uri="{BB962C8B-B14F-4D97-AF65-F5344CB8AC3E}">
         <p14:creationId xmlns:p14="http://schemas.microsoft.com/office/powerpoint/2010/main" val="150677319"/>
+      </p:ext>
+    </p:extLst>
+  </p:cSld>
+  <p:clrMapOvr>
+    <a:masterClrMapping/>
+  </p:clrMapOvr>
+</p:notes>
+</file>
+
+<file path=ppt/notesSlides/notesSlide4.xml><?xml version="1.0" encoding="utf-8"?>
+<p:notes xmlns:a="http://schemas.openxmlformats.org/drawingml/2006/main" xmlns:r="http://schemas.openxmlformats.org/officeDocument/2006/relationships" xmlns:p="http://schemas.openxmlformats.org/presentationml/2006/main">
+  <p:cSld>
+    <p:spTree>
+      <p:nvGrpSpPr>
+        <p:cNvPr id="1" name=""/>
+        <p:cNvGrpSpPr/>
+        <p:nvPr/>
+      </p:nvGrpSpPr>
+      <p:grpSpPr>
+        <a:xfrm>
+          <a:off x="0" y="0"/>
+          <a:ext cx="0" cy="0"/>
+          <a:chOff x="0" y="0"/>
+          <a:chExt cx="0" cy="0"/>
+        </a:xfrm>
+      </p:grpSpPr>
+      <p:sp>
+        <p:nvSpPr>
+          <p:cNvPr id="2" name="幻灯片图像占位符 1"/>
+          <p:cNvSpPr>
+            <a:spLocks noGrp="1" noRot="1" noChangeAspect="1"/>
+          </p:cNvSpPr>
+          <p:nvPr>
+            <p:ph type="sldImg"/>
+          </p:nvPr>
+        </p:nvSpPr>
+        <p:spPr/>
+      </p:sp>
+      <p:sp>
+        <p:nvSpPr>
+          <p:cNvPr id="3" name="备注占位符 2"/>
+          <p:cNvSpPr>
+            <a:spLocks noGrp="1"/>
+          </p:cNvSpPr>
+          <p:nvPr>
+            <p:ph type="body" idx="1"/>
+          </p:nvPr>
+        </p:nvSpPr>
+        <p:spPr/>
+        <p:txBody>
+          <a:bodyPr/>
+          <a:lstStyle/>
+          <a:p>
+            <a:pPr marL="171450" indent="-171450">
+              <a:buFont typeface="Arial" panose="020B0604020202020204" pitchFamily="34" charset="0"/>
+              <a:buChar char="•"/>
+            </a:pPr>
+            <a:r>
+              <a:rPr lang="en-US" altLang="zh-CN" dirty="0"/>
+              <a:t>pkg/</a:t>
+            </a:r>
+            <a:r>
+              <a:rPr lang="en-US" altLang="zh-CN" dirty="0" err="1"/>
+              <a:t>kubelet</a:t>
+            </a:r>
+            <a:r>
+              <a:rPr lang="en-US" altLang="zh-CN" dirty="0"/>
+              <a:t>/</a:t>
+            </a:r>
+            <a:r>
+              <a:rPr lang="en-US" altLang="zh-CN" dirty="0" err="1"/>
+              <a:t>kuberuntime</a:t>
+            </a:r>
+            <a:r>
+              <a:rPr lang="en-US" altLang="zh-CN" dirty="0"/>
+              <a:t>/</a:t>
+            </a:r>
+            <a:r>
+              <a:rPr lang="en-US" altLang="zh-CN" dirty="0" err="1"/>
+              <a:t>kuberuntime_manager.go</a:t>
+            </a:r>
+            <a:r>
+              <a:rPr lang="en-US" altLang="zh-CN" dirty="0"/>
+              <a:t> </a:t>
+            </a:r>
+            <a:r>
+              <a:rPr lang="en-US" altLang="zh-CN" dirty="0" err="1">
+                <a:solidFill>
+                  <a:srgbClr val="E6B163"/>
+                </a:solidFill>
+                <a:effectLst/>
+              </a:rPr>
+              <a:t>SyncPod</a:t>
+            </a:r>
+            <a:endParaRPr lang="en-US" altLang="zh-CN" dirty="0"/>
+          </a:p>
+          <a:p>
+            <a:pPr marL="171450" indent="-171450">
+              <a:buFont typeface="Arial" panose="020B0604020202020204" pitchFamily="34" charset="0"/>
+              <a:buChar char="•"/>
+            </a:pPr>
+            <a:r>
+              <a:rPr lang="en-US" altLang="zh-CN" dirty="0"/>
+              <a:t>Sandbox </a:t>
+            </a:r>
+            <a:r>
+              <a:rPr lang="zh-CN" altLang="en-US" dirty="0"/>
+              <a:t>为 </a:t>
+            </a:r>
+            <a:r>
+              <a:rPr lang="en-US" altLang="zh-CN" dirty="0"/>
+              <a:t>Container </a:t>
+            </a:r>
+            <a:r>
+              <a:rPr lang="zh-CN" altLang="en-US" dirty="0"/>
+              <a:t>提供一定的运行环境，这其中包括 </a:t>
+            </a:r>
+            <a:r>
+              <a:rPr lang="en-US" altLang="zh-CN" dirty="0"/>
+              <a:t>pod </a:t>
+            </a:r>
+            <a:r>
+              <a:rPr lang="zh-CN" altLang="en-US" dirty="0"/>
+              <a:t>的网络等。 </a:t>
+            </a:r>
+            <a:r>
+              <a:rPr lang="en-US" altLang="zh-CN" dirty="0"/>
+              <a:t>Container </a:t>
+            </a:r>
+            <a:r>
+              <a:rPr lang="zh-CN" altLang="en-US" dirty="0"/>
+              <a:t>包括容器生命周期的具体操作，</a:t>
+            </a:r>
+            <a:r>
+              <a:rPr lang="en-US" altLang="zh-CN" dirty="0"/>
+              <a:t>Image </a:t>
+            </a:r>
+            <a:r>
+              <a:rPr lang="zh-CN" altLang="en-US" dirty="0"/>
+              <a:t>则提供对镜像的操作。</a:t>
+            </a:r>
+            <a:endParaRPr lang="en-US" altLang="zh-CN" dirty="0"/>
+          </a:p>
+          <a:p>
+            <a:pPr marL="171450" indent="-171450">
+              <a:buFont typeface="Arial" panose="020B0604020202020204" pitchFamily="34" charset="0"/>
+              <a:buChar char="•"/>
+            </a:pPr>
+            <a:r>
+              <a:rPr lang="en-US" altLang="zh-CN" b="0" i="0" dirty="0">
+                <a:solidFill>
+                  <a:srgbClr val="121212"/>
+                </a:solidFill>
+                <a:effectLst/>
+                <a:latin typeface="-apple-system"/>
+              </a:rPr>
+              <a:t>CRI </a:t>
+            </a:r>
+            <a:r>
+              <a:rPr lang="zh-CN" altLang="en-US" b="0" i="0" dirty="0">
+                <a:solidFill>
+                  <a:srgbClr val="121212"/>
+                </a:solidFill>
+                <a:effectLst/>
+                <a:latin typeface="-apple-system"/>
+              </a:rPr>
+              <a:t>体系里，</a:t>
+            </a:r>
+            <a:r>
+              <a:rPr lang="en-US" altLang="zh-CN" b="0" i="0" dirty="0">
+                <a:solidFill>
+                  <a:srgbClr val="121212"/>
+                </a:solidFill>
+                <a:effectLst/>
+                <a:latin typeface="-apple-system"/>
+              </a:rPr>
+              <a:t>Pod Sandbox </a:t>
+            </a:r>
+            <a:r>
+              <a:rPr lang="zh-CN" altLang="en-US" b="0" i="0" dirty="0">
+                <a:solidFill>
+                  <a:srgbClr val="121212"/>
+                </a:solidFill>
+                <a:effectLst/>
+                <a:latin typeface="-apple-system"/>
+              </a:rPr>
+              <a:t>其实就是 </a:t>
+            </a:r>
+            <a:r>
+              <a:rPr lang="en-US" altLang="zh-CN" b="0" i="0" dirty="0">
+                <a:solidFill>
+                  <a:srgbClr val="121212"/>
+                </a:solidFill>
+                <a:effectLst/>
+                <a:latin typeface="-apple-system"/>
+              </a:rPr>
+              <a:t>pause </a:t>
+            </a:r>
+            <a:r>
+              <a:rPr lang="zh-CN" altLang="en-US" b="0" i="0" dirty="0">
+                <a:solidFill>
+                  <a:srgbClr val="121212"/>
+                </a:solidFill>
+                <a:effectLst/>
+                <a:latin typeface="-apple-system"/>
+              </a:rPr>
+              <a:t>容器。</a:t>
+            </a:r>
+            <a:endParaRPr lang="zh-CN" altLang="en-US" dirty="0"/>
+          </a:p>
+        </p:txBody>
+      </p:sp>
+      <p:sp>
+        <p:nvSpPr>
+          <p:cNvPr id="4" name="灯片编号占位符 3"/>
+          <p:cNvSpPr>
+            <a:spLocks noGrp="1"/>
+          </p:cNvSpPr>
+          <p:nvPr>
+            <p:ph type="sldNum" sz="quarter" idx="5"/>
+          </p:nvPr>
+        </p:nvSpPr>
+        <p:spPr/>
+        <p:txBody>
+          <a:bodyPr/>
+          <a:lstStyle/>
+          <a:p>
+            <a:fld id="{A2233CC5-F75D-4D11-A25F-1E852ECE9806}" type="slidenum">
+              <a:rPr lang="zh-CN" altLang="en-US" smtClean="0"/>
+              <a:t>19</a:t>
+            </a:fld>
+            <a:endParaRPr lang="zh-CN" altLang="en-US"/>
+          </a:p>
+        </p:txBody>
+      </p:sp>
+    </p:spTree>
+    <p:extLst>
+      <p:ext uri="{BB962C8B-B14F-4D97-AF65-F5344CB8AC3E}">
+        <p14:creationId xmlns:p14="http://schemas.microsoft.com/office/powerpoint/2010/main" val="1256627606"/>
+      </p:ext>
+    </p:extLst>
+  </p:cSld>
+  <p:clrMapOvr>
+    <a:masterClrMapping/>
+  </p:clrMapOvr>
+</p:notes>
+</file>
+
+<file path=ppt/notesSlides/notesSlide5.xml><?xml version="1.0" encoding="utf-8"?>
+<p:notes xmlns:a="http://schemas.openxmlformats.org/drawingml/2006/main" xmlns:r="http://schemas.openxmlformats.org/officeDocument/2006/relationships" xmlns:p="http://schemas.openxmlformats.org/presentationml/2006/main">
+  <p:cSld>
+    <p:spTree>
+      <p:nvGrpSpPr>
+        <p:cNvPr id="1" name=""/>
+        <p:cNvGrpSpPr/>
+        <p:nvPr/>
+      </p:nvGrpSpPr>
+      <p:grpSpPr>
+        <a:xfrm>
+          <a:off x="0" y="0"/>
+          <a:ext cx="0" cy="0"/>
+          <a:chOff x="0" y="0"/>
+          <a:chExt cx="0" cy="0"/>
+        </a:xfrm>
+      </p:grpSpPr>
+      <p:sp>
+        <p:nvSpPr>
+          <p:cNvPr id="2" name="幻灯片图像占位符 1"/>
+          <p:cNvSpPr>
+            <a:spLocks noGrp="1" noRot="1" noChangeAspect="1"/>
+          </p:cNvSpPr>
+          <p:nvPr>
+            <p:ph type="sldImg"/>
+          </p:nvPr>
+        </p:nvSpPr>
+        <p:spPr/>
+      </p:sp>
+      <p:sp>
+        <p:nvSpPr>
+          <p:cNvPr id="3" name="备注占位符 2"/>
+          <p:cNvSpPr>
+            <a:spLocks noGrp="1"/>
+          </p:cNvSpPr>
+          <p:nvPr>
+            <p:ph type="body" idx="1"/>
+          </p:nvPr>
+        </p:nvSpPr>
+        <p:spPr/>
+        <p:txBody>
+          <a:bodyPr/>
+          <a:lstStyle/>
+          <a:p>
+            <a:r>
+              <a:rPr lang="zh-CN" altLang="en-US" b="0" i="0" dirty="0">
+                <a:solidFill>
+                  <a:srgbClr val="333333"/>
+                </a:solidFill>
+                <a:effectLst/>
+                <a:latin typeface="Merriweather" panose="020B0604020202020204" pitchFamily="2" charset="0"/>
+              </a:rPr>
+              <a:t>调用内部的生命周期方法 </a:t>
+            </a:r>
+            <a:r>
+              <a:rPr lang="en-US" altLang="zh-CN" dirty="0" err="1"/>
+              <a:t>PreStartContainer</a:t>
+            </a:r>
+            <a:r>
+              <a:rPr lang="en-US" altLang="zh-CN" b="0" i="0" dirty="0">
+                <a:solidFill>
+                  <a:srgbClr val="333333"/>
+                </a:solidFill>
+                <a:effectLst/>
+                <a:latin typeface="Merriweather" panose="020B0604020202020204" pitchFamily="2" charset="0"/>
+              </a:rPr>
+              <a:t> </a:t>
+            </a:r>
+            <a:r>
+              <a:rPr lang="zh-CN" altLang="en-US" b="0" i="0" dirty="0">
+                <a:solidFill>
+                  <a:srgbClr val="333333"/>
+                </a:solidFill>
+                <a:effectLst/>
+                <a:latin typeface="Merriweather" panose="020B0604020202020204" pitchFamily="2" charset="0"/>
+              </a:rPr>
+              <a:t>为当前的容器设置分配的 </a:t>
+            </a:r>
+            <a:r>
+              <a:rPr lang="en-US" altLang="zh-CN" b="0" i="0" dirty="0">
+                <a:solidFill>
+                  <a:srgbClr val="333333"/>
+                </a:solidFill>
+                <a:effectLst/>
+                <a:latin typeface="Merriweather" panose="020B0604020202020204" pitchFamily="2" charset="0"/>
+              </a:rPr>
+              <a:t>CPU </a:t>
+            </a:r>
+            <a:r>
+              <a:rPr lang="zh-CN" altLang="en-US" b="0" i="0" dirty="0">
+                <a:solidFill>
+                  <a:srgbClr val="333333"/>
+                </a:solidFill>
+                <a:effectLst/>
+                <a:latin typeface="Merriweather" panose="020B0604020202020204" pitchFamily="2" charset="0"/>
+              </a:rPr>
+              <a:t>等资源</a:t>
+            </a:r>
+            <a:endParaRPr lang="zh-CN" altLang="en-US" dirty="0"/>
+          </a:p>
+        </p:txBody>
+      </p:sp>
+      <p:sp>
+        <p:nvSpPr>
+          <p:cNvPr id="4" name="灯片编号占位符 3"/>
+          <p:cNvSpPr>
+            <a:spLocks noGrp="1"/>
+          </p:cNvSpPr>
+          <p:nvPr>
+            <p:ph type="sldNum" sz="quarter" idx="5"/>
+          </p:nvPr>
+        </p:nvSpPr>
+        <p:spPr/>
+        <p:txBody>
+          <a:bodyPr/>
+          <a:lstStyle/>
+          <a:p>
+            <a:fld id="{A2233CC5-F75D-4D11-A25F-1E852ECE9806}" type="slidenum">
+              <a:rPr lang="zh-CN" altLang="en-US" smtClean="0"/>
+              <a:t>20</a:t>
+            </a:fld>
+            <a:endParaRPr lang="zh-CN" altLang="en-US"/>
+          </a:p>
+        </p:txBody>
+      </p:sp>
+    </p:spTree>
+    <p:extLst>
+      <p:ext uri="{BB962C8B-B14F-4D97-AF65-F5344CB8AC3E}">
+        <p14:creationId xmlns:p14="http://schemas.microsoft.com/office/powerpoint/2010/main" val="2056220364"/>
       </p:ext>
     </p:extLst>
   </p:cSld>
@@ -37183,7 +40034,7 @@
           <a:p>
             <a:fld id="{8BA9216E-B78E-4B37-A46B-9D5E94D01D3E}" type="datetimeFigureOut">
               <a:rPr lang="zh-CN" altLang="en-US" smtClean="0"/>
-              <a:t>2022/10/19</a:t>
+              <a:t>2022/10/24</a:t>
             </a:fld>
             <a:endParaRPr lang="zh-CN" altLang="en-US"/>
           </a:p>
@@ -37434,7 +40285,7 @@
           <a:p>
             <a:fld id="{8BA9216E-B78E-4B37-A46B-9D5E94D01D3E}" type="datetimeFigureOut">
               <a:rPr lang="zh-CN" altLang="en-US" smtClean="0"/>
-              <a:t>2022/10/19</a:t>
+              <a:t>2022/10/24</a:t>
             </a:fld>
             <a:endParaRPr lang="zh-CN" altLang="en-US"/>
           </a:p>
@@ -37748,7 +40599,7 @@
           <a:p>
             <a:fld id="{8BA9216E-B78E-4B37-A46B-9D5E94D01D3E}" type="datetimeFigureOut">
               <a:rPr lang="zh-CN" altLang="en-US" smtClean="0"/>
-              <a:t>2022/10/19</a:t>
+              <a:t>2022/10/24</a:t>
             </a:fld>
             <a:endParaRPr lang="zh-CN" altLang="en-US"/>
           </a:p>
@@ -38089,7 +40940,7 @@
           <a:p>
             <a:fld id="{8BA9216E-B78E-4B37-A46B-9D5E94D01D3E}" type="datetimeFigureOut">
               <a:rPr lang="zh-CN" altLang="en-US" smtClean="0"/>
-              <a:t>2022/10/19</a:t>
+              <a:t>2022/10/24</a:t>
             </a:fld>
             <a:endParaRPr lang="zh-CN" altLang="en-US"/>
           </a:p>
@@ -38403,7 +41254,7 @@
           <a:p>
             <a:fld id="{8BA9216E-B78E-4B37-A46B-9D5E94D01D3E}" type="datetimeFigureOut">
               <a:rPr lang="zh-CN" altLang="en-US" smtClean="0"/>
-              <a:t>2022/10/19</a:t>
+              <a:t>2022/10/24</a:t>
             </a:fld>
             <a:endParaRPr lang="zh-CN" altLang="en-US"/>
           </a:p>
@@ -38796,7 +41647,7 @@
           <a:p>
             <a:fld id="{8BA9216E-B78E-4B37-A46B-9D5E94D01D3E}" type="datetimeFigureOut">
               <a:rPr lang="zh-CN" altLang="en-US" smtClean="0"/>
-              <a:t>2022/10/19</a:t>
+              <a:t>2022/10/24</a:t>
             </a:fld>
             <a:endParaRPr lang="zh-CN" altLang="en-US"/>
           </a:p>
@@ -38966,7 +41817,7 @@
           <a:p>
             <a:fld id="{8BA9216E-B78E-4B37-A46B-9D5E94D01D3E}" type="datetimeFigureOut">
               <a:rPr lang="zh-CN" altLang="en-US" smtClean="0"/>
-              <a:t>2022/10/19</a:t>
+              <a:t>2022/10/24</a:t>
             </a:fld>
             <a:endParaRPr lang="zh-CN" altLang="en-US"/>
           </a:p>
@@ -39146,7 +41997,7 @@
           <a:p>
             <a:fld id="{8BA9216E-B78E-4B37-A46B-9D5E94D01D3E}" type="datetimeFigureOut">
               <a:rPr lang="zh-CN" altLang="en-US" smtClean="0"/>
-              <a:t>2022/10/19</a:t>
+              <a:t>2022/10/24</a:t>
             </a:fld>
             <a:endParaRPr lang="zh-CN" altLang="en-US"/>
           </a:p>
@@ -39322,7 +42173,7 @@
           <a:p>
             <a:fld id="{8BA9216E-B78E-4B37-A46B-9D5E94D01D3E}" type="datetimeFigureOut">
               <a:rPr lang="zh-CN" altLang="en-US" smtClean="0"/>
-              <a:t>2022/10/19</a:t>
+              <a:t>2022/10/24</a:t>
             </a:fld>
             <a:endParaRPr lang="zh-CN" altLang="en-US"/>
           </a:p>
@@ -39569,7 +42420,7 @@
           <a:p>
             <a:fld id="{8BA9216E-B78E-4B37-A46B-9D5E94D01D3E}" type="datetimeFigureOut">
               <a:rPr lang="zh-CN" altLang="en-US" smtClean="0"/>
-              <a:t>2022/10/19</a:t>
+              <a:t>2022/10/24</a:t>
             </a:fld>
             <a:endParaRPr lang="zh-CN" altLang="en-US"/>
           </a:p>
@@ -39801,7 +42652,7 @@
           <a:p>
             <a:fld id="{8BA9216E-B78E-4B37-A46B-9D5E94D01D3E}" type="datetimeFigureOut">
               <a:rPr lang="zh-CN" altLang="en-US" smtClean="0"/>
-              <a:t>2022/10/19</a:t>
+              <a:t>2022/10/24</a:t>
             </a:fld>
             <a:endParaRPr lang="zh-CN" altLang="en-US"/>
           </a:p>
@@ -40175,7 +43026,7 @@
           <a:p>
             <a:fld id="{8BA9216E-B78E-4B37-A46B-9D5E94D01D3E}" type="datetimeFigureOut">
               <a:rPr lang="zh-CN" altLang="en-US" smtClean="0"/>
-              <a:t>2022/10/19</a:t>
+              <a:t>2022/10/24</a:t>
             </a:fld>
             <a:endParaRPr lang="zh-CN" altLang="en-US"/>
           </a:p>
@@ -40298,7 +43149,7 @@
           <a:p>
             <a:fld id="{8BA9216E-B78E-4B37-A46B-9D5E94D01D3E}" type="datetimeFigureOut">
               <a:rPr lang="zh-CN" altLang="en-US" smtClean="0"/>
-              <a:t>2022/10/19</a:t>
+              <a:t>2022/10/24</a:t>
             </a:fld>
             <a:endParaRPr lang="zh-CN" altLang="en-US"/>
           </a:p>
@@ -40393,7 +43244,7 @@
           <a:p>
             <a:fld id="{8BA9216E-B78E-4B37-A46B-9D5E94D01D3E}" type="datetimeFigureOut">
               <a:rPr lang="zh-CN" altLang="en-US" smtClean="0"/>
-              <a:t>2022/10/19</a:t>
+              <a:t>2022/10/24</a:t>
             </a:fld>
             <a:endParaRPr lang="zh-CN" altLang="en-US"/>
           </a:p>
@@ -40648,7 +43499,7 @@
           <a:p>
             <a:fld id="{8BA9216E-B78E-4B37-A46B-9D5E94D01D3E}" type="datetimeFigureOut">
               <a:rPr lang="zh-CN" altLang="en-US" smtClean="0"/>
-              <a:t>2022/10/19</a:t>
+              <a:t>2022/10/24</a:t>
             </a:fld>
             <a:endParaRPr lang="zh-CN" altLang="en-US"/>
           </a:p>
@@ -40911,7 +43762,7 @@
           <a:p>
             <a:fld id="{8BA9216E-B78E-4B37-A46B-9D5E94D01D3E}" type="datetimeFigureOut">
               <a:rPr lang="zh-CN" altLang="en-US" smtClean="0"/>
-              <a:t>2022/10/19</a:t>
+              <a:t>2022/10/24</a:t>
             </a:fld>
             <a:endParaRPr lang="zh-CN" altLang="en-US"/>
           </a:p>
@@ -41654,7 +44505,7 @@
           <a:p>
             <a:fld id="{8BA9216E-B78E-4B37-A46B-9D5E94D01D3E}" type="datetimeFigureOut">
               <a:rPr lang="zh-CN" altLang="en-US" smtClean="0"/>
-              <a:t>2022/10/19</a:t>
+              <a:t>2022/10/24</a:t>
             </a:fld>
             <a:endParaRPr lang="zh-CN" altLang="en-US"/>
           </a:p>
@@ -43729,7 +46580,14 @@
           <a:bodyPr/>
           <a:lstStyle/>
           <a:p>
-            <a:endParaRPr lang="zh-CN" altLang="en-US"/>
+            <a:r>
+              <a:rPr lang="en-US" altLang="zh-CN" dirty="0"/>
+              <a:t>Pod </a:t>
+            </a:r>
+            <a:r>
+              <a:rPr lang="zh-CN" altLang="en-US" dirty="0"/>
+              <a:t>的生命周期</a:t>
+            </a:r>
           </a:p>
         </p:txBody>
       </p:sp>
@@ -43746,7 +46604,7 @@
             <a:picLocks noGrp="1" noChangeAspect="1" noChangeArrowheads="1"/>
           </p:cNvPicPr>
           <p:nvPr>
-            <p:ph idx="1"/>
+            <p:ph sz="half" idx="1"/>
           </p:nvPr>
         </p:nvPicPr>
         <p:blipFill>
@@ -43757,15 +46615,14 @@
               </a:ext>
             </a:extLst>
           </a:blip>
-          <a:srcRect/>
           <a:stretch>
             <a:fillRect/>
           </a:stretch>
         </p:blipFill>
         <p:spPr bwMode="auto">
           <a:xfrm>
-            <a:off x="741724" y="2160588"/>
-            <a:ext cx="8468589" cy="3881437"/>
+            <a:off x="677863" y="2160589"/>
+            <a:ext cx="4183062" cy="3880773"/>
           </a:xfrm>
           <a:prstGeom prst="rect">
             <a:avLst/>
@@ -43782,6 +46639,37 @@
           </a:extLst>
         </p:spPr>
       </p:pic>
+      <p:graphicFrame>
+        <p:nvGraphicFramePr>
+          <p:cNvPr id="5" name="内容占位符 4">
+            <a:extLst>
+              <a:ext uri="{FF2B5EF4-FFF2-40B4-BE49-F238E27FC236}">
+                <a16:creationId xmlns:a16="http://schemas.microsoft.com/office/drawing/2014/main" id="{837E7FEE-1ED7-FD44-BB8E-7D024A7BE7CB}"/>
+              </a:ext>
+            </a:extLst>
+          </p:cNvPr>
+          <p:cNvGraphicFramePr>
+            <a:graphicFrameLocks noGrp="1"/>
+          </p:cNvGraphicFramePr>
+          <p:nvPr>
+            <p:ph sz="half" idx="2"/>
+            <p:extLst>
+              <p:ext uri="{D42A27DB-BD31-4B8C-83A1-F6EECF244321}">
+                <p14:modId xmlns:p14="http://schemas.microsoft.com/office/powerpoint/2010/main" val="2747849665"/>
+              </p:ext>
+            </p:extLst>
+          </p:nvPr>
+        </p:nvGraphicFramePr>
+        <p:xfrm>
+          <a:off x="5089970" y="2160589"/>
+          <a:ext cx="4184034" cy="3880773"/>
+        </p:xfrm>
+        <a:graphic>
+          <a:graphicData uri="http://schemas.openxmlformats.org/drawingml/2006/diagram">
+            <dgm:relIds xmlns:dgm="http://schemas.openxmlformats.org/drawingml/2006/diagram" xmlns:r="http://schemas.openxmlformats.org/officeDocument/2006/relationships" r:dm="rId3" r:lo="rId4" r:qs="rId5" r:cs="rId6"/>
+          </a:graphicData>
+        </a:graphic>
+      </p:graphicFrame>
     </p:spTree>
     <p:extLst>
       <p:ext uri="{BB962C8B-B14F-4D97-AF65-F5344CB8AC3E}">
@@ -43861,7 +46749,7 @@
           </p:nvPr>
         </p:nvPicPr>
         <p:blipFill>
-          <a:blip r:embed="rId2"/>
+          <a:blip r:embed="rId3"/>
           <a:stretch>
             <a:fillRect/>
           </a:stretch>
@@ -43890,7 +46778,7 @@
           </p:nvPr>
         </p:nvPicPr>
         <p:blipFill>
-          <a:blip r:embed="rId3"/>
+          <a:blip r:embed="rId4"/>
           <a:stretch>
             <a:fillRect/>
           </a:stretch>
@@ -44034,6 +46922,230 @@
           <p:cNvPr id="2" name="标题 1">
             <a:extLst>
               <a:ext uri="{FF2B5EF4-FFF2-40B4-BE49-F238E27FC236}">
+                <a16:creationId xmlns:a16="http://schemas.microsoft.com/office/drawing/2014/main" id="{DFBFB2F0-6F50-DDA3-8D02-96779A09BB1C}"/>
+              </a:ext>
+            </a:extLst>
+          </p:cNvPr>
+          <p:cNvSpPr>
+            <a:spLocks noGrp="1"/>
+          </p:cNvSpPr>
+          <p:nvPr>
+            <p:ph type="title"/>
+          </p:nvPr>
+        </p:nvSpPr>
+        <p:spPr/>
+        <p:txBody>
+          <a:bodyPr/>
+          <a:lstStyle/>
+          <a:p>
+            <a:r>
+              <a:rPr lang="zh-CN" altLang="en-US" dirty="0"/>
+              <a:t>创建容器过程</a:t>
+            </a:r>
+          </a:p>
+        </p:txBody>
+      </p:sp>
+      <p:pic>
+        <p:nvPicPr>
+          <p:cNvPr id="8" name="内容占位符 7">
+            <a:extLst>
+              <a:ext uri="{FF2B5EF4-FFF2-40B4-BE49-F238E27FC236}">
+                <a16:creationId xmlns:a16="http://schemas.microsoft.com/office/drawing/2014/main" id="{C4457874-D443-72B8-9102-19091EBA41B2}"/>
+              </a:ext>
+            </a:extLst>
+          </p:cNvPr>
+          <p:cNvPicPr>
+            <a:picLocks noGrp="1" noChangeAspect="1"/>
+          </p:cNvPicPr>
+          <p:nvPr>
+            <p:ph sz="half" idx="2"/>
+          </p:nvPr>
+        </p:nvPicPr>
+        <p:blipFill>
+          <a:blip r:embed="rId3"/>
+          <a:stretch>
+            <a:fillRect/>
+          </a:stretch>
+        </p:blipFill>
+        <p:spPr>
+          <a:xfrm>
+            <a:off x="5089525" y="2716458"/>
+            <a:ext cx="4184650" cy="2769696"/>
+          </a:xfrm>
+        </p:spPr>
+      </p:pic>
+      <p:pic>
+        <p:nvPicPr>
+          <p:cNvPr id="12" name="内容占位符 11">
+            <a:extLst>
+              <a:ext uri="{FF2B5EF4-FFF2-40B4-BE49-F238E27FC236}">
+                <a16:creationId xmlns:a16="http://schemas.microsoft.com/office/drawing/2014/main" id="{F6DA6510-50C8-70D8-3CBD-FB9A0D82FD35}"/>
+              </a:ext>
+            </a:extLst>
+          </p:cNvPr>
+          <p:cNvPicPr>
+            <a:picLocks noGrp="1" noChangeAspect="1"/>
+          </p:cNvPicPr>
+          <p:nvPr>
+            <p:ph sz="half" idx="1"/>
+          </p:nvPr>
+        </p:nvPicPr>
+        <p:blipFill>
+          <a:blip r:embed="rId4"/>
+          <a:stretch>
+            <a:fillRect/>
+          </a:stretch>
+        </p:blipFill>
+        <p:spPr>
+          <a:xfrm>
+            <a:off x="1967902" y="2160588"/>
+            <a:ext cx="1602983" cy="3881437"/>
+          </a:xfrm>
+        </p:spPr>
+      </p:pic>
+    </p:spTree>
+    <p:extLst>
+      <p:ext uri="{BB962C8B-B14F-4D97-AF65-F5344CB8AC3E}">
+        <p14:creationId xmlns:p14="http://schemas.microsoft.com/office/powerpoint/2010/main" val="1659118853"/>
+      </p:ext>
+    </p:extLst>
+  </p:cSld>
+  <p:clrMapOvr>
+    <a:masterClrMapping/>
+  </p:clrMapOvr>
+</p:sld>
+</file>
+
+<file path=ppt/slides/slide21.xml><?xml version="1.0" encoding="utf-8"?>
+<p:sld xmlns:a="http://schemas.openxmlformats.org/drawingml/2006/main" xmlns:r="http://schemas.openxmlformats.org/officeDocument/2006/relationships" xmlns:p="http://schemas.openxmlformats.org/presentationml/2006/main">
+  <p:cSld>
+    <p:spTree>
+      <p:nvGrpSpPr>
+        <p:cNvPr id="1" name=""/>
+        <p:cNvGrpSpPr/>
+        <p:nvPr/>
+      </p:nvGrpSpPr>
+      <p:grpSpPr>
+        <a:xfrm>
+          <a:off x="0" y="0"/>
+          <a:ext cx="0" cy="0"/>
+          <a:chOff x="0" y="0"/>
+          <a:chExt cx="0" cy="0"/>
+        </a:xfrm>
+      </p:grpSpPr>
+      <p:sp>
+        <p:nvSpPr>
+          <p:cNvPr id="2" name="标题 1">
+            <a:extLst>
+              <a:ext uri="{FF2B5EF4-FFF2-40B4-BE49-F238E27FC236}">
+                <a16:creationId xmlns:a16="http://schemas.microsoft.com/office/drawing/2014/main" id="{2AA6A035-A4CF-A20C-5FC0-3458D8E0682F}"/>
+              </a:ext>
+            </a:extLst>
+          </p:cNvPr>
+          <p:cNvSpPr>
+            <a:spLocks noGrp="1"/>
+          </p:cNvSpPr>
+          <p:nvPr>
+            <p:ph type="title"/>
+          </p:nvPr>
+        </p:nvSpPr>
+        <p:spPr/>
+        <p:txBody>
+          <a:bodyPr/>
+          <a:lstStyle/>
+          <a:p>
+            <a:r>
+              <a:rPr lang="zh-CN" altLang="en-US"/>
+              <a:t>健康检查过程</a:t>
+            </a:r>
+          </a:p>
+        </p:txBody>
+      </p:sp>
+      <p:sp>
+        <p:nvSpPr>
+          <p:cNvPr id="3" name="内容占位符 2">
+            <a:extLst>
+              <a:ext uri="{FF2B5EF4-FFF2-40B4-BE49-F238E27FC236}">
+                <a16:creationId xmlns:a16="http://schemas.microsoft.com/office/drawing/2014/main" id="{2C9BE720-0699-FAC2-544C-F4329FA6F3F5}"/>
+              </a:ext>
+            </a:extLst>
+          </p:cNvPr>
+          <p:cNvSpPr>
+            <a:spLocks noGrp="1"/>
+          </p:cNvSpPr>
+          <p:nvPr>
+            <p:ph sz="half" idx="1"/>
+          </p:nvPr>
+        </p:nvSpPr>
+        <p:spPr/>
+        <p:txBody>
+          <a:bodyPr/>
+          <a:lstStyle/>
+          <a:p>
+            <a:endParaRPr lang="zh-CN" altLang="en-US"/>
+          </a:p>
+        </p:txBody>
+      </p:sp>
+      <p:sp>
+        <p:nvSpPr>
+          <p:cNvPr id="4" name="内容占位符 3">
+            <a:extLst>
+              <a:ext uri="{FF2B5EF4-FFF2-40B4-BE49-F238E27FC236}">
+                <a16:creationId xmlns:a16="http://schemas.microsoft.com/office/drawing/2014/main" id="{C4F0DDD1-F180-B32B-1168-FAEF3598A530}"/>
+              </a:ext>
+            </a:extLst>
+          </p:cNvPr>
+          <p:cNvSpPr>
+            <a:spLocks noGrp="1"/>
+          </p:cNvSpPr>
+          <p:nvPr>
+            <p:ph sz="half" idx="2"/>
+          </p:nvPr>
+        </p:nvSpPr>
+        <p:spPr/>
+        <p:txBody>
+          <a:bodyPr/>
+          <a:lstStyle/>
+          <a:p>
+            <a:endParaRPr lang="zh-CN" altLang="en-US"/>
+          </a:p>
+        </p:txBody>
+      </p:sp>
+    </p:spTree>
+    <p:extLst>
+      <p:ext uri="{BB962C8B-B14F-4D97-AF65-F5344CB8AC3E}">
+        <p14:creationId xmlns:p14="http://schemas.microsoft.com/office/powerpoint/2010/main" val="2219481250"/>
+      </p:ext>
+    </p:extLst>
+  </p:cSld>
+  <p:clrMapOvr>
+    <a:masterClrMapping/>
+  </p:clrMapOvr>
+</p:sld>
+</file>
+
+<file path=ppt/slides/slide22.xml><?xml version="1.0" encoding="utf-8"?>
+<p:sld xmlns:a="http://schemas.openxmlformats.org/drawingml/2006/main" xmlns:r="http://schemas.openxmlformats.org/officeDocument/2006/relationships" xmlns:p="http://schemas.openxmlformats.org/presentationml/2006/main">
+  <p:cSld>
+    <p:spTree>
+      <p:nvGrpSpPr>
+        <p:cNvPr id="1" name=""/>
+        <p:cNvGrpSpPr/>
+        <p:nvPr/>
+      </p:nvGrpSpPr>
+      <p:grpSpPr>
+        <a:xfrm>
+          <a:off x="0" y="0"/>
+          <a:ext cx="0" cy="0"/>
+          <a:chOff x="0" y="0"/>
+          <a:chExt cx="0" cy="0"/>
+        </a:xfrm>
+      </p:grpSpPr>
+      <p:sp>
+        <p:nvSpPr>
+          <p:cNvPr id="2" name="标题 1">
+            <a:extLst>
+              <a:ext uri="{FF2B5EF4-FFF2-40B4-BE49-F238E27FC236}">
                 <a16:creationId xmlns:a16="http://schemas.microsoft.com/office/drawing/2014/main" id="{4D791E6F-3EE2-8CA3-E498-1FDF1DAAD624}"/>
               </a:ext>
             </a:extLst>
@@ -44102,7 +47214,7 @@
 </p:sld>
 </file>
 
-<file path=ppt/slides/slide21.xml><?xml version="1.0" encoding="utf-8"?>
+<file path=ppt/slides/slide23.xml><?xml version="1.0" encoding="utf-8"?>
 <p:sld xmlns:a="http://schemas.openxmlformats.org/drawingml/2006/main" xmlns:r="http://schemas.openxmlformats.org/officeDocument/2006/relationships" xmlns:p="http://schemas.openxmlformats.org/presentationml/2006/main">
   <p:cSld>
     <p:spTree>
@@ -44344,7 +47456,7 @@
 </p:sld>
 </file>
 
-<file path=ppt/slides/slide22.xml><?xml version="1.0" encoding="utf-8"?>
+<file path=ppt/slides/slide24.xml><?xml version="1.0" encoding="utf-8"?>
 <p:sld xmlns:a="http://schemas.openxmlformats.org/drawingml/2006/main" xmlns:r="http://schemas.openxmlformats.org/officeDocument/2006/relationships" xmlns:p="http://schemas.openxmlformats.org/presentationml/2006/main">
   <p:cSld>
     <p:spTree>
@@ -44836,7 +47948,7 @@
 </p:sld>
 </file>
 
-<file path=ppt/slides/slide23.xml><?xml version="1.0" encoding="utf-8"?>
+<file path=ppt/slides/slide25.xml><?xml version="1.0" encoding="utf-8"?>
 <p:sld xmlns:a="http://schemas.openxmlformats.org/drawingml/2006/main" xmlns:r="http://schemas.openxmlformats.org/officeDocument/2006/relationships" xmlns:p="http://schemas.openxmlformats.org/presentationml/2006/main">
   <p:cSld>
     <p:spTree>
@@ -45593,7 +48705,7 @@
 </p:sld>
 </file>
 
-<file path=ppt/slides/slide24.xml><?xml version="1.0" encoding="utf-8"?>
+<file path=ppt/slides/slide26.xml><?xml version="1.0" encoding="utf-8"?>
 <p:sld xmlns:a="http://schemas.openxmlformats.org/drawingml/2006/main" xmlns:r="http://schemas.openxmlformats.org/officeDocument/2006/relationships" xmlns:p="http://schemas.openxmlformats.org/presentationml/2006/main">
   <p:cSld>
     <p:spTree>
@@ -45686,7 +48798,7 @@
 </p:sld>
 </file>
 
-<file path=ppt/slides/slide25.xml><?xml version="1.0" encoding="utf-8"?>
+<file path=ppt/slides/slide27.xml><?xml version="1.0" encoding="utf-8"?>
 <p:sld xmlns:a="http://schemas.openxmlformats.org/drawingml/2006/main" xmlns:r="http://schemas.openxmlformats.org/officeDocument/2006/relationships" xmlns:p="http://schemas.openxmlformats.org/presentationml/2006/main">
   <p:cSld>
     <p:spTree>
@@ -46175,7 +49287,7 @@
 </p:sld>
 </file>
 
-<file path=ppt/slides/slide26.xml><?xml version="1.0" encoding="utf-8"?>
+<file path=ppt/slides/slide28.xml><?xml version="1.0" encoding="utf-8"?>
 <p:sld xmlns:a="http://schemas.openxmlformats.org/drawingml/2006/main" xmlns:r="http://schemas.openxmlformats.org/officeDocument/2006/relationships" xmlns:p="http://schemas.openxmlformats.org/presentationml/2006/main">
   <p:cSld>
     <p:spTree>
@@ -46367,7 +49479,7 @@
 </p:sld>
 </file>
 
-<file path=ppt/slides/slide27.xml><?xml version="1.0" encoding="utf-8"?>
+<file path=ppt/slides/slide29.xml><?xml version="1.0" encoding="utf-8"?>
 <p:sld xmlns:a="http://schemas.openxmlformats.org/drawingml/2006/main" xmlns:r="http://schemas.openxmlformats.org/officeDocument/2006/relationships" xmlns:p="http://schemas.openxmlformats.org/presentationml/2006/main">
   <p:cSld>
     <p:spTree>
@@ -46464,7 +49576,101 @@
 </p:sld>
 </file>
 
-<file path=ppt/slides/slide28.xml><?xml version="1.0" encoding="utf-8"?>
+<file path=ppt/slides/slide3.xml><?xml version="1.0" encoding="utf-8"?>
+<p:sld xmlns:a="http://schemas.openxmlformats.org/drawingml/2006/main" xmlns:r="http://schemas.openxmlformats.org/officeDocument/2006/relationships" xmlns:p="http://schemas.openxmlformats.org/presentationml/2006/main">
+  <p:cSld>
+    <p:spTree>
+      <p:nvGrpSpPr>
+        <p:cNvPr id="1" name=""/>
+        <p:cNvGrpSpPr/>
+        <p:nvPr/>
+      </p:nvGrpSpPr>
+      <p:grpSpPr>
+        <a:xfrm>
+          <a:off x="0" y="0"/>
+          <a:ext cx="0" cy="0"/>
+          <a:chOff x="0" y="0"/>
+          <a:chExt cx="0" cy="0"/>
+        </a:xfrm>
+      </p:grpSpPr>
+      <p:sp>
+        <p:nvSpPr>
+          <p:cNvPr id="2" name="标题 1">
+            <a:extLst>
+              <a:ext uri="{FF2B5EF4-FFF2-40B4-BE49-F238E27FC236}">
+                <a16:creationId xmlns:a16="http://schemas.microsoft.com/office/drawing/2014/main" id="{4D791E6F-3EE2-8CA3-E498-1FDF1DAAD624}"/>
+              </a:ext>
+            </a:extLst>
+          </p:cNvPr>
+          <p:cNvSpPr>
+            <a:spLocks noGrp="1"/>
+          </p:cNvSpPr>
+          <p:nvPr>
+            <p:ph type="title"/>
+          </p:nvPr>
+        </p:nvSpPr>
+        <p:spPr/>
+        <p:txBody>
+          <a:bodyPr/>
+          <a:lstStyle/>
+          <a:p>
+            <a:r>
+              <a:rPr lang="zh-CN" altLang="en-US" dirty="0"/>
+              <a:t>一、</a:t>
+            </a:r>
+            <a:r>
+              <a:rPr lang="en-US" altLang="zh-CN" dirty="0"/>
+              <a:t>Kubernetes Pod</a:t>
+            </a:r>
+            <a:endParaRPr lang="zh-CN" altLang="en-US" dirty="0"/>
+          </a:p>
+        </p:txBody>
+      </p:sp>
+      <p:graphicFrame>
+        <p:nvGraphicFramePr>
+          <p:cNvPr id="17" name="内容占位符 16">
+            <a:extLst>
+              <a:ext uri="{FF2B5EF4-FFF2-40B4-BE49-F238E27FC236}">
+                <a16:creationId xmlns:a16="http://schemas.microsoft.com/office/drawing/2014/main" id="{20B99BEE-5749-4C00-AA0C-8A7D64AC73CC}"/>
+              </a:ext>
+            </a:extLst>
+          </p:cNvPr>
+          <p:cNvGraphicFramePr>
+            <a:graphicFrameLocks noGrp="1"/>
+          </p:cNvGraphicFramePr>
+          <p:nvPr>
+            <p:ph idx="1"/>
+            <p:extLst>
+              <p:ext uri="{D42A27DB-BD31-4B8C-83A1-F6EECF244321}">
+                <p14:modId xmlns:p14="http://schemas.microsoft.com/office/powerpoint/2010/main" val="945295105"/>
+              </p:ext>
+            </p:extLst>
+          </p:nvPr>
+        </p:nvGraphicFramePr>
+        <p:xfrm>
+          <a:off x="677334" y="2160589"/>
+          <a:ext cx="8596668" cy="3880773"/>
+        </p:xfrm>
+        <a:graphic>
+          <a:graphicData uri="http://schemas.openxmlformats.org/drawingml/2006/diagram">
+            <dgm:relIds xmlns:dgm="http://schemas.openxmlformats.org/drawingml/2006/diagram" xmlns:r="http://schemas.openxmlformats.org/officeDocument/2006/relationships" r:dm="rId2" r:lo="rId3" r:qs="rId4" r:cs="rId5"/>
+          </a:graphicData>
+        </a:graphic>
+      </p:graphicFrame>
+    </p:spTree>
+    <p:extLst>
+      <p:ext uri="{BB962C8B-B14F-4D97-AF65-F5344CB8AC3E}">
+        <p14:creationId xmlns:p14="http://schemas.microsoft.com/office/powerpoint/2010/main" val="725947467"/>
+      </p:ext>
+    </p:extLst>
+  </p:cSld>
+  <p:clrMapOvr>
+    <a:masterClrMapping/>
+  </p:clrMapOvr>
+</p:sld>
+</file>
+
+<file path=ppt/slides/slide30.xml><?xml version="1.0" encoding="utf-8"?>
 <p:sld xmlns:a="http://schemas.openxmlformats.org/drawingml/2006/main" xmlns:r="http://schemas.openxmlformats.org/officeDocument/2006/relationships" xmlns:p="http://schemas.openxmlformats.org/presentationml/2006/main">
   <p:cSld>
     <p:spTree>
@@ -46586,7 +49792,7 @@
 </p:sld>
 </file>
 
-<file path=ppt/slides/slide29.xml><?xml version="1.0" encoding="utf-8"?>
+<file path=ppt/slides/slide31.xml><?xml version="1.0" encoding="utf-8"?>
 <p:sld xmlns:a="http://schemas.openxmlformats.org/drawingml/2006/main" xmlns:r="http://schemas.openxmlformats.org/officeDocument/2006/relationships" xmlns:p="http://schemas.openxmlformats.org/presentationml/2006/main">
   <p:cSld>
     <p:spTree>
@@ -46721,101 +49927,7 @@
 </p:sld>
 </file>
 
-<file path=ppt/slides/slide3.xml><?xml version="1.0" encoding="utf-8"?>
-<p:sld xmlns:a="http://schemas.openxmlformats.org/drawingml/2006/main" xmlns:r="http://schemas.openxmlformats.org/officeDocument/2006/relationships" xmlns:p="http://schemas.openxmlformats.org/presentationml/2006/main">
-  <p:cSld>
-    <p:spTree>
-      <p:nvGrpSpPr>
-        <p:cNvPr id="1" name=""/>
-        <p:cNvGrpSpPr/>
-        <p:nvPr/>
-      </p:nvGrpSpPr>
-      <p:grpSpPr>
-        <a:xfrm>
-          <a:off x="0" y="0"/>
-          <a:ext cx="0" cy="0"/>
-          <a:chOff x="0" y="0"/>
-          <a:chExt cx="0" cy="0"/>
-        </a:xfrm>
-      </p:grpSpPr>
-      <p:sp>
-        <p:nvSpPr>
-          <p:cNvPr id="2" name="标题 1">
-            <a:extLst>
-              <a:ext uri="{FF2B5EF4-FFF2-40B4-BE49-F238E27FC236}">
-                <a16:creationId xmlns:a16="http://schemas.microsoft.com/office/drawing/2014/main" id="{4D791E6F-3EE2-8CA3-E498-1FDF1DAAD624}"/>
-              </a:ext>
-            </a:extLst>
-          </p:cNvPr>
-          <p:cNvSpPr>
-            <a:spLocks noGrp="1"/>
-          </p:cNvSpPr>
-          <p:nvPr>
-            <p:ph type="title"/>
-          </p:nvPr>
-        </p:nvSpPr>
-        <p:spPr/>
-        <p:txBody>
-          <a:bodyPr/>
-          <a:lstStyle/>
-          <a:p>
-            <a:r>
-              <a:rPr lang="zh-CN" altLang="en-US" dirty="0"/>
-              <a:t>一、</a:t>
-            </a:r>
-            <a:r>
-              <a:rPr lang="en-US" altLang="zh-CN" dirty="0"/>
-              <a:t>Kubernetes Pod</a:t>
-            </a:r>
-            <a:endParaRPr lang="zh-CN" altLang="en-US" dirty="0"/>
-          </a:p>
-        </p:txBody>
-      </p:sp>
-      <p:graphicFrame>
-        <p:nvGraphicFramePr>
-          <p:cNvPr id="17" name="内容占位符 16">
-            <a:extLst>
-              <a:ext uri="{FF2B5EF4-FFF2-40B4-BE49-F238E27FC236}">
-                <a16:creationId xmlns:a16="http://schemas.microsoft.com/office/drawing/2014/main" id="{20B99BEE-5749-4C00-AA0C-8A7D64AC73CC}"/>
-              </a:ext>
-            </a:extLst>
-          </p:cNvPr>
-          <p:cNvGraphicFramePr>
-            <a:graphicFrameLocks noGrp="1"/>
-          </p:cNvGraphicFramePr>
-          <p:nvPr>
-            <p:ph idx="1"/>
-            <p:extLst>
-              <p:ext uri="{D42A27DB-BD31-4B8C-83A1-F6EECF244321}">
-                <p14:modId xmlns:p14="http://schemas.microsoft.com/office/powerpoint/2010/main" val="945295105"/>
-              </p:ext>
-            </p:extLst>
-          </p:nvPr>
-        </p:nvGraphicFramePr>
-        <p:xfrm>
-          <a:off x="677334" y="2160589"/>
-          <a:ext cx="8596668" cy="3880773"/>
-        </p:xfrm>
-        <a:graphic>
-          <a:graphicData uri="http://schemas.openxmlformats.org/drawingml/2006/diagram">
-            <dgm:relIds xmlns:dgm="http://schemas.openxmlformats.org/drawingml/2006/diagram" xmlns:r="http://schemas.openxmlformats.org/officeDocument/2006/relationships" r:dm="rId2" r:lo="rId3" r:qs="rId4" r:cs="rId5"/>
-          </a:graphicData>
-        </a:graphic>
-      </p:graphicFrame>
-    </p:spTree>
-    <p:extLst>
-      <p:ext uri="{BB962C8B-B14F-4D97-AF65-F5344CB8AC3E}">
-        <p14:creationId xmlns:p14="http://schemas.microsoft.com/office/powerpoint/2010/main" val="725947467"/>
-      </p:ext>
-    </p:extLst>
-  </p:cSld>
-  <p:clrMapOvr>
-    <a:masterClrMapping/>
-  </p:clrMapOvr>
-</p:sld>
-</file>
-
-<file path=ppt/slides/slide30.xml><?xml version="1.0" encoding="utf-8"?>
+<file path=ppt/slides/slide32.xml><?xml version="1.0" encoding="utf-8"?>
 <p:sld xmlns:a="http://schemas.openxmlformats.org/drawingml/2006/main" xmlns:r="http://schemas.openxmlformats.org/officeDocument/2006/relationships" xmlns:p="http://schemas.openxmlformats.org/presentationml/2006/main">
   <p:cSld>
     <p:spTree>
@@ -46936,7 +50048,7 @@
 </p:sld>
 </file>
 
-<file path=ppt/slides/slide31.xml><?xml version="1.0" encoding="utf-8"?>
+<file path=ppt/slides/slide33.xml><?xml version="1.0" encoding="utf-8"?>
 <p:sld xmlns:a="http://schemas.openxmlformats.org/drawingml/2006/main" xmlns:r="http://schemas.openxmlformats.org/officeDocument/2006/relationships" xmlns:p="http://schemas.openxmlformats.org/presentationml/2006/main">
   <p:cSld>
     <p:spTree>
@@ -47056,7 +50168,7 @@
 </p:sld>
 </file>
 
-<file path=ppt/slides/slide32.xml><?xml version="1.0" encoding="utf-8"?>
+<file path=ppt/slides/slide34.xml><?xml version="1.0" encoding="utf-8"?>
 <p:sld xmlns:a="http://schemas.openxmlformats.org/drawingml/2006/main" xmlns:r="http://schemas.openxmlformats.org/officeDocument/2006/relationships" xmlns:p="http://schemas.openxmlformats.org/presentationml/2006/main">
   <p:cSld>
     <p:spTree>

</xml_diff>